<commit_message>
separação das seções da apresentação
</commit_message>
<xml_diff>
--- a/apresentacao-final.pptx
+++ b/apresentacao-final.pptx
@@ -5,32 +5,42 @@
     <p:sldMasterId id="2147483648" r:id="rId1"/>
   </p:sldMasterIdLst>
   <p:notesMasterIdLst>
-    <p:notesMasterId r:id="rId8"/>
+    <p:notesMasterId r:id="rId18"/>
   </p:notesMasterIdLst>
   <p:sldIdLst>
     <p:sldId id="256" r:id="rId2"/>
     <p:sldId id="474" r:id="rId3"/>
     <p:sldId id="477" r:id="rId4"/>
     <p:sldId id="478" r:id="rId5"/>
-    <p:sldId id="471" r:id="rId6"/>
-    <p:sldId id="473" r:id="rId7"/>
+    <p:sldId id="479" r:id="rId6"/>
+    <p:sldId id="480" r:id="rId7"/>
+    <p:sldId id="481" r:id="rId8"/>
+    <p:sldId id="482" r:id="rId9"/>
+    <p:sldId id="487" r:id="rId10"/>
+    <p:sldId id="488" r:id="rId11"/>
+    <p:sldId id="483" r:id="rId12"/>
+    <p:sldId id="484" r:id="rId13"/>
+    <p:sldId id="485" r:id="rId14"/>
+    <p:sldId id="486" r:id="rId15"/>
+    <p:sldId id="471" r:id="rId16"/>
+    <p:sldId id="473" r:id="rId17"/>
   </p:sldIdLst>
   <p:sldSz cx="12192000" cy="6858000"/>
   <p:notesSz cx="6858000" cy="9144000"/>
   <p:embeddedFontLst>
     <p:embeddedFont>
       <p:font typeface="Calibri" panose="020F0502020204030204" pitchFamily="34" charset="0"/>
-      <p:regular r:id="rId9"/>
-      <p:bold r:id="rId10"/>
-      <p:italic r:id="rId11"/>
-      <p:boldItalic r:id="rId12"/>
+      <p:regular r:id="rId19"/>
+      <p:bold r:id="rId20"/>
+      <p:italic r:id="rId21"/>
+      <p:boldItalic r:id="rId22"/>
     </p:embeddedFont>
     <p:embeddedFont>
       <p:font typeface="Fira Sans" panose="020B0503050000020004" pitchFamily="34" charset="0"/>
-      <p:regular r:id="rId13"/>
-      <p:bold r:id="rId14"/>
-      <p:italic r:id="rId15"/>
-      <p:boldItalic r:id="rId16"/>
+      <p:regular r:id="rId23"/>
+      <p:bold r:id="rId24"/>
+      <p:italic r:id="rId25"/>
+      <p:boldItalic r:id="rId26"/>
     </p:embeddedFont>
   </p:embeddedFontLst>
   <p:defaultTextStyle>
@@ -131,16 +141,46 @@
   <p:extLst>
     <p:ext uri="{521415D9-36F7-43E2-AB2F-B90AF26B5E84}">
       <p14:sectionLst xmlns:p14="http://schemas.microsoft.com/office/powerpoint/2010/main">
-        <p14:section name="Default Section" id="{97BA7875-7995-4AA2-BB54-42FD0D3AB0E7}">
+        <p14:section name="INÍCIO" id="{97BA7875-7995-4AA2-BB54-42FD0D3AB0E7}">
           <p14:sldIdLst>
             <p14:sldId id="256"/>
             <p14:sldId id="474"/>
           </p14:sldIdLst>
         </p14:section>
-        <p14:section name="Nome da Seção" id="{B9D8CD90-9CA1-4D83-819D-75218314FA5D}">
+        <p14:section name="Introdução" id="{B9D8CD90-9CA1-4D83-819D-75218314FA5D}">
           <p14:sldIdLst>
             <p14:sldId id="477"/>
             <p14:sldId id="478"/>
+          </p14:sldIdLst>
+        </p14:section>
+        <p14:section name="AlexNet e ResNet" id="{97A7D4A1-415E-4C6D-A35D-4440082D8F35}">
+          <p14:sldIdLst>
+            <p14:sldId id="479"/>
+            <p14:sldId id="480"/>
+          </p14:sldIdLst>
+        </p14:section>
+        <p14:section name="Experimentos" id="{E308249D-BB35-4266-9AA0-76844E64EDA8}">
+          <p14:sldIdLst>
+            <p14:sldId id="481"/>
+            <p14:sldId id="482"/>
+          </p14:sldIdLst>
+        </p14:section>
+        <p14:section name="Resultados" id="{F77CBFE7-DE76-4BBB-B26B-A6AA2298CBD7}">
+          <p14:sldIdLst>
+            <p14:sldId id="487"/>
+            <p14:sldId id="488"/>
+          </p14:sldIdLst>
+        </p14:section>
+        <p14:section name="Discussão e considerações" id="{60C2C7AC-99AB-4116-B6AE-4426E5EFB29B}">
+          <p14:sldIdLst>
+            <p14:sldId id="483"/>
+            <p14:sldId id="484"/>
+          </p14:sldIdLst>
+        </p14:section>
+        <p14:section name="Conclusão" id="{8604FD3D-BD40-40F3-B7F3-0512B993087B}">
+          <p14:sldIdLst>
+            <p14:sldId id="485"/>
+            <p14:sldId id="486"/>
           </p14:sldIdLst>
         </p14:section>
         <p14:section name="FIM" id="{E6556246-A68D-4576-9F03-7F48586C6C03}">
@@ -5037,6 +5077,1253 @@
 </p:sld>
 </file>
 
+<file path=ppt/slides/slide10.xml><?xml version="1.0" encoding="utf-8"?>
+<p:sld xmlns:a="http://schemas.openxmlformats.org/drawingml/2006/main" xmlns:r="http://schemas.openxmlformats.org/officeDocument/2006/relationships" xmlns:p="http://schemas.openxmlformats.org/presentationml/2006/main">
+  <p:cSld>
+    <p:spTree>
+      <p:nvGrpSpPr>
+        <p:cNvPr id="1" name=""/>
+        <p:cNvGrpSpPr/>
+        <p:nvPr/>
+      </p:nvGrpSpPr>
+      <p:grpSpPr>
+        <a:xfrm>
+          <a:off x="0" y="0"/>
+          <a:ext cx="0" cy="0"/>
+          <a:chOff x="0" y="0"/>
+          <a:chExt cx="0" cy="0"/>
+        </a:xfrm>
+      </p:grpSpPr>
+      <p:sp>
+        <p:nvSpPr>
+          <p:cNvPr id="13" name="Content Placeholder 12">
+            <a:extLst>
+              <a:ext uri="{FF2B5EF4-FFF2-40B4-BE49-F238E27FC236}">
+                <a16:creationId xmlns:a16="http://schemas.microsoft.com/office/drawing/2014/main" id="{B6B46987-6570-415B-8F92-54BD5CC6781C}"/>
+              </a:ext>
+            </a:extLst>
+          </p:cNvPr>
+          <p:cNvSpPr>
+            <a:spLocks noGrp="1"/>
+          </p:cNvSpPr>
+          <p:nvPr>
+            <p:ph idx="1"/>
+          </p:nvPr>
+        </p:nvSpPr>
+        <p:spPr/>
+        <p:txBody>
+          <a:bodyPr/>
+          <a:lstStyle/>
+          <a:p>
+            <a:endParaRPr lang="pt-BR"/>
+          </a:p>
+        </p:txBody>
+      </p:sp>
+      <p:sp>
+        <p:nvSpPr>
+          <p:cNvPr id="7" name="Title 6">
+            <a:extLst>
+              <a:ext uri="{FF2B5EF4-FFF2-40B4-BE49-F238E27FC236}">
+                <a16:creationId xmlns:a16="http://schemas.microsoft.com/office/drawing/2014/main" id="{CEFC600F-5C28-49BA-96C4-7E0B3DEE9C26}"/>
+              </a:ext>
+            </a:extLst>
+          </p:cNvPr>
+          <p:cNvSpPr>
+            <a:spLocks noGrp="1"/>
+          </p:cNvSpPr>
+          <p:nvPr>
+            <p:ph type="title"/>
+          </p:nvPr>
+        </p:nvSpPr>
+        <p:spPr>
+          <a:xfrm>
+            <a:off x="1155469" y="66183"/>
+            <a:ext cx="10914610" cy="1334336"/>
+          </a:xfrm>
+        </p:spPr>
+        <p:txBody>
+          <a:bodyPr/>
+          <a:lstStyle/>
+          <a:p>
+            <a:r>
+              <a:rPr lang="pt-BR" dirty="0"/>
+              <a:t>Resultados</a:t>
+            </a:r>
+          </a:p>
+        </p:txBody>
+      </p:sp>
+      <p:sp>
+        <p:nvSpPr>
+          <p:cNvPr id="4" name="Date Placeholder 3">
+            <a:extLst>
+              <a:ext uri="{FF2B5EF4-FFF2-40B4-BE49-F238E27FC236}">
+                <a16:creationId xmlns:a16="http://schemas.microsoft.com/office/drawing/2014/main" id="{66EAB9D3-2A09-491C-8833-02AB09A1EE2D}"/>
+              </a:ext>
+            </a:extLst>
+          </p:cNvPr>
+          <p:cNvSpPr>
+            <a:spLocks noGrp="1"/>
+          </p:cNvSpPr>
+          <p:nvPr>
+            <p:ph type="dt" sz="half" idx="10"/>
+          </p:nvPr>
+        </p:nvSpPr>
+        <p:spPr>
+          <a:xfrm>
+            <a:off x="156557" y="6350138"/>
+            <a:ext cx="2743200" cy="365125"/>
+          </a:xfrm>
+        </p:spPr>
+        <p:txBody>
+          <a:bodyPr/>
+          <a:lstStyle/>
+          <a:p>
+            <a:r>
+              <a:rPr lang="pt-BR"/>
+              <a:t>Nome do Apresentador - email</a:t>
+            </a:r>
+            <a:endParaRPr lang="pt-BR" dirty="0"/>
+          </a:p>
+        </p:txBody>
+      </p:sp>
+      <p:sp>
+        <p:nvSpPr>
+          <p:cNvPr id="5" name="Footer Placeholder 4">
+            <a:extLst>
+              <a:ext uri="{FF2B5EF4-FFF2-40B4-BE49-F238E27FC236}">
+                <a16:creationId xmlns:a16="http://schemas.microsoft.com/office/drawing/2014/main" id="{8AA0FFBD-7651-4269-9653-4098295EE79C}"/>
+              </a:ext>
+            </a:extLst>
+          </p:cNvPr>
+          <p:cNvSpPr>
+            <a:spLocks noGrp="1"/>
+          </p:cNvSpPr>
+          <p:nvPr>
+            <p:ph type="ftr" sz="quarter" idx="11"/>
+          </p:nvPr>
+        </p:nvSpPr>
+        <p:spPr>
+          <a:xfrm>
+            <a:off x="4038600" y="6356350"/>
+            <a:ext cx="4114800" cy="365125"/>
+          </a:xfrm>
+        </p:spPr>
+        <p:txBody>
+          <a:bodyPr/>
+          <a:lstStyle/>
+          <a:p>
+            <a:r>
+              <a:rPr lang="pt-BR"/>
+              <a:t>Título da apresentação</a:t>
+            </a:r>
+            <a:endParaRPr lang="pt-BR" dirty="0"/>
+          </a:p>
+        </p:txBody>
+      </p:sp>
+      <p:sp>
+        <p:nvSpPr>
+          <p:cNvPr id="6" name="Slide Number Placeholder 5">
+            <a:extLst>
+              <a:ext uri="{FF2B5EF4-FFF2-40B4-BE49-F238E27FC236}">
+                <a16:creationId xmlns:a16="http://schemas.microsoft.com/office/drawing/2014/main" id="{5A9C589F-A23D-4FE6-8623-E197ED8DA27C}"/>
+              </a:ext>
+            </a:extLst>
+          </p:cNvPr>
+          <p:cNvSpPr>
+            <a:spLocks noGrp="1"/>
+          </p:cNvSpPr>
+          <p:nvPr>
+            <p:ph type="sldNum" sz="quarter" idx="12"/>
+          </p:nvPr>
+        </p:nvSpPr>
+        <p:spPr>
+          <a:xfrm>
+            <a:off x="8801100" y="6350138"/>
+            <a:ext cx="2743200" cy="365125"/>
+          </a:xfrm>
+        </p:spPr>
+        <p:txBody>
+          <a:bodyPr/>
+          <a:lstStyle/>
+          <a:p>
+            <a:fld id="{943EB55C-D1D3-4EA7-96FF-7B21F10BDCBD}" type="slidenum">
+              <a:rPr lang="pt-BR" smtClean="0"/>
+              <a:pPr/>
+              <a:t>10</a:t>
+            </a:fld>
+            <a:endParaRPr lang="pt-BR" dirty="0"/>
+          </a:p>
+        </p:txBody>
+      </p:sp>
+    </p:spTree>
+    <p:extLst>
+      <p:ext uri="{BB962C8B-B14F-4D97-AF65-F5344CB8AC3E}">
+        <p14:creationId xmlns:p14="http://schemas.microsoft.com/office/powerpoint/2010/main" val="1731404137"/>
+      </p:ext>
+    </p:extLst>
+  </p:cSld>
+  <p:clrMapOvr>
+    <a:masterClrMapping/>
+  </p:clrMapOvr>
+</p:sld>
+</file>
+
+<file path=ppt/slides/slide11.xml><?xml version="1.0" encoding="utf-8"?>
+<p:sld xmlns:a="http://schemas.openxmlformats.org/drawingml/2006/main" xmlns:r="http://schemas.openxmlformats.org/officeDocument/2006/relationships" xmlns:p="http://schemas.openxmlformats.org/presentationml/2006/main">
+  <p:cSld>
+    <p:spTree>
+      <p:nvGrpSpPr>
+        <p:cNvPr id="1" name=""/>
+        <p:cNvGrpSpPr/>
+        <p:nvPr/>
+      </p:nvGrpSpPr>
+      <p:grpSpPr>
+        <a:xfrm>
+          <a:off x="0" y="0"/>
+          <a:ext cx="0" cy="0"/>
+          <a:chOff x="0" y="0"/>
+          <a:chExt cx="0" cy="0"/>
+        </a:xfrm>
+      </p:grpSpPr>
+      <p:sp>
+        <p:nvSpPr>
+          <p:cNvPr id="7" name="Title 6">
+            <a:extLst>
+              <a:ext uri="{FF2B5EF4-FFF2-40B4-BE49-F238E27FC236}">
+                <a16:creationId xmlns:a16="http://schemas.microsoft.com/office/drawing/2014/main" id="{9CC6423C-8458-46DA-B904-ACDE246A1D10}"/>
+              </a:ext>
+            </a:extLst>
+          </p:cNvPr>
+          <p:cNvSpPr>
+            <a:spLocks noGrp="1"/>
+          </p:cNvSpPr>
+          <p:nvPr>
+            <p:ph type="title"/>
+          </p:nvPr>
+        </p:nvSpPr>
+        <p:spPr>
+          <a:xfrm>
+            <a:off x="831850" y="1709738"/>
+            <a:ext cx="10515600" cy="2852737"/>
+          </a:xfrm>
+        </p:spPr>
+        <p:txBody>
+          <a:bodyPr/>
+          <a:lstStyle/>
+          <a:p>
+            <a:r>
+              <a:rPr lang="pt-BR" dirty="0"/>
+              <a:t>Discussão e considerações</a:t>
+            </a:r>
+            <a:br>
+              <a:rPr lang="pt-BR" dirty="0"/>
+            </a:br>
+            <a:endParaRPr lang="pt-BR" dirty="0"/>
+          </a:p>
+        </p:txBody>
+      </p:sp>
+      <p:sp>
+        <p:nvSpPr>
+          <p:cNvPr id="13" name="Text Placeholder 12">
+            <a:extLst>
+              <a:ext uri="{FF2B5EF4-FFF2-40B4-BE49-F238E27FC236}">
+                <a16:creationId xmlns:a16="http://schemas.microsoft.com/office/drawing/2014/main" id="{B30C2ED5-76F3-4F62-A6AA-A6FBD0AB33B6}"/>
+              </a:ext>
+            </a:extLst>
+          </p:cNvPr>
+          <p:cNvSpPr>
+            <a:spLocks noGrp="1"/>
+          </p:cNvSpPr>
+          <p:nvPr>
+            <p:ph type="body" idx="1"/>
+          </p:nvPr>
+        </p:nvSpPr>
+        <p:spPr/>
+        <p:txBody>
+          <a:bodyPr/>
+          <a:lstStyle/>
+          <a:p>
+            <a:endParaRPr lang="pt-BR"/>
+          </a:p>
+        </p:txBody>
+      </p:sp>
+      <p:sp>
+        <p:nvSpPr>
+          <p:cNvPr id="4" name="Date Placeholder 3">
+            <a:extLst>
+              <a:ext uri="{FF2B5EF4-FFF2-40B4-BE49-F238E27FC236}">
+                <a16:creationId xmlns:a16="http://schemas.microsoft.com/office/drawing/2014/main" id="{7C5D03F3-4FCC-4BAA-987F-D7F5F97D7EA1}"/>
+              </a:ext>
+            </a:extLst>
+          </p:cNvPr>
+          <p:cNvSpPr>
+            <a:spLocks noGrp="1"/>
+          </p:cNvSpPr>
+          <p:nvPr>
+            <p:ph type="dt" sz="half" idx="10"/>
+          </p:nvPr>
+        </p:nvSpPr>
+        <p:spPr>
+          <a:xfrm>
+            <a:off x="156557" y="6350138"/>
+            <a:ext cx="2743200" cy="365125"/>
+          </a:xfrm>
+        </p:spPr>
+        <p:txBody>
+          <a:bodyPr/>
+          <a:lstStyle/>
+          <a:p>
+            <a:r>
+              <a:rPr lang="pt-BR"/>
+              <a:t>Nome do Apresentador - email</a:t>
+            </a:r>
+            <a:endParaRPr lang="pt-BR" dirty="0"/>
+          </a:p>
+        </p:txBody>
+      </p:sp>
+      <p:sp>
+        <p:nvSpPr>
+          <p:cNvPr id="5" name="Footer Placeholder 4">
+            <a:extLst>
+              <a:ext uri="{FF2B5EF4-FFF2-40B4-BE49-F238E27FC236}">
+                <a16:creationId xmlns:a16="http://schemas.microsoft.com/office/drawing/2014/main" id="{6D958900-CEE3-43FE-A1A6-0F5416100DBF}"/>
+              </a:ext>
+            </a:extLst>
+          </p:cNvPr>
+          <p:cNvSpPr>
+            <a:spLocks noGrp="1"/>
+          </p:cNvSpPr>
+          <p:nvPr>
+            <p:ph type="ftr" sz="quarter" idx="11"/>
+          </p:nvPr>
+        </p:nvSpPr>
+        <p:spPr>
+          <a:xfrm>
+            <a:off x="4038600" y="6356350"/>
+            <a:ext cx="4114800" cy="365125"/>
+          </a:xfrm>
+        </p:spPr>
+        <p:txBody>
+          <a:bodyPr/>
+          <a:lstStyle/>
+          <a:p>
+            <a:r>
+              <a:rPr lang="pt-BR"/>
+              <a:t>Título da apresentação</a:t>
+            </a:r>
+            <a:endParaRPr lang="pt-BR" dirty="0"/>
+          </a:p>
+        </p:txBody>
+      </p:sp>
+      <p:sp>
+        <p:nvSpPr>
+          <p:cNvPr id="6" name="Slide Number Placeholder 5">
+            <a:extLst>
+              <a:ext uri="{FF2B5EF4-FFF2-40B4-BE49-F238E27FC236}">
+                <a16:creationId xmlns:a16="http://schemas.microsoft.com/office/drawing/2014/main" id="{26F4D796-AF50-49B2-A75A-AE182D8637CC}"/>
+              </a:ext>
+            </a:extLst>
+          </p:cNvPr>
+          <p:cNvSpPr>
+            <a:spLocks noGrp="1"/>
+          </p:cNvSpPr>
+          <p:nvPr>
+            <p:ph type="sldNum" sz="quarter" idx="12"/>
+          </p:nvPr>
+        </p:nvSpPr>
+        <p:spPr>
+          <a:xfrm>
+            <a:off x="8801100" y="6350138"/>
+            <a:ext cx="2743200" cy="365125"/>
+          </a:xfrm>
+        </p:spPr>
+        <p:txBody>
+          <a:bodyPr/>
+          <a:lstStyle/>
+          <a:p>
+            <a:fld id="{943EB55C-D1D3-4EA7-96FF-7B21F10BDCBD}" type="slidenum">
+              <a:rPr lang="pt-BR" smtClean="0"/>
+              <a:pPr/>
+              <a:t>11</a:t>
+            </a:fld>
+            <a:endParaRPr lang="pt-BR" dirty="0"/>
+          </a:p>
+        </p:txBody>
+      </p:sp>
+    </p:spTree>
+    <p:extLst>
+      <p:ext uri="{BB962C8B-B14F-4D97-AF65-F5344CB8AC3E}">
+        <p14:creationId xmlns:p14="http://schemas.microsoft.com/office/powerpoint/2010/main" val="1907464498"/>
+      </p:ext>
+    </p:extLst>
+  </p:cSld>
+  <p:clrMapOvr>
+    <a:masterClrMapping/>
+  </p:clrMapOvr>
+</p:sld>
+</file>
+
+<file path=ppt/slides/slide12.xml><?xml version="1.0" encoding="utf-8"?>
+<p:sld xmlns:a="http://schemas.openxmlformats.org/drawingml/2006/main" xmlns:r="http://schemas.openxmlformats.org/officeDocument/2006/relationships" xmlns:p="http://schemas.openxmlformats.org/presentationml/2006/main">
+  <p:cSld>
+    <p:spTree>
+      <p:nvGrpSpPr>
+        <p:cNvPr id="1" name=""/>
+        <p:cNvGrpSpPr/>
+        <p:nvPr/>
+      </p:nvGrpSpPr>
+      <p:grpSpPr>
+        <a:xfrm>
+          <a:off x="0" y="0"/>
+          <a:ext cx="0" cy="0"/>
+          <a:chOff x="0" y="0"/>
+          <a:chExt cx="0" cy="0"/>
+        </a:xfrm>
+      </p:grpSpPr>
+      <p:sp>
+        <p:nvSpPr>
+          <p:cNvPr id="13" name="Content Placeholder 12">
+            <a:extLst>
+              <a:ext uri="{FF2B5EF4-FFF2-40B4-BE49-F238E27FC236}">
+                <a16:creationId xmlns:a16="http://schemas.microsoft.com/office/drawing/2014/main" id="{B6B46987-6570-415B-8F92-54BD5CC6781C}"/>
+              </a:ext>
+            </a:extLst>
+          </p:cNvPr>
+          <p:cNvSpPr>
+            <a:spLocks noGrp="1"/>
+          </p:cNvSpPr>
+          <p:nvPr>
+            <p:ph idx="1"/>
+          </p:nvPr>
+        </p:nvSpPr>
+        <p:spPr/>
+        <p:txBody>
+          <a:bodyPr/>
+          <a:lstStyle/>
+          <a:p>
+            <a:endParaRPr lang="pt-BR"/>
+          </a:p>
+        </p:txBody>
+      </p:sp>
+      <p:sp>
+        <p:nvSpPr>
+          <p:cNvPr id="7" name="Title 6">
+            <a:extLst>
+              <a:ext uri="{FF2B5EF4-FFF2-40B4-BE49-F238E27FC236}">
+                <a16:creationId xmlns:a16="http://schemas.microsoft.com/office/drawing/2014/main" id="{CEFC600F-5C28-49BA-96C4-7E0B3DEE9C26}"/>
+              </a:ext>
+            </a:extLst>
+          </p:cNvPr>
+          <p:cNvSpPr>
+            <a:spLocks noGrp="1"/>
+          </p:cNvSpPr>
+          <p:nvPr>
+            <p:ph type="title"/>
+          </p:nvPr>
+        </p:nvSpPr>
+        <p:spPr>
+          <a:xfrm>
+            <a:off x="1155469" y="66183"/>
+            <a:ext cx="10914610" cy="1334336"/>
+          </a:xfrm>
+        </p:spPr>
+        <p:txBody>
+          <a:bodyPr/>
+          <a:lstStyle/>
+          <a:p>
+            <a:r>
+              <a:rPr lang="pt-BR" dirty="0"/>
+              <a:t>Discussão e considerações</a:t>
+            </a:r>
+          </a:p>
+        </p:txBody>
+      </p:sp>
+      <p:sp>
+        <p:nvSpPr>
+          <p:cNvPr id="4" name="Date Placeholder 3">
+            <a:extLst>
+              <a:ext uri="{FF2B5EF4-FFF2-40B4-BE49-F238E27FC236}">
+                <a16:creationId xmlns:a16="http://schemas.microsoft.com/office/drawing/2014/main" id="{66EAB9D3-2A09-491C-8833-02AB09A1EE2D}"/>
+              </a:ext>
+            </a:extLst>
+          </p:cNvPr>
+          <p:cNvSpPr>
+            <a:spLocks noGrp="1"/>
+          </p:cNvSpPr>
+          <p:nvPr>
+            <p:ph type="dt" sz="half" idx="10"/>
+          </p:nvPr>
+        </p:nvSpPr>
+        <p:spPr>
+          <a:xfrm>
+            <a:off x="156557" y="6350138"/>
+            <a:ext cx="2743200" cy="365125"/>
+          </a:xfrm>
+        </p:spPr>
+        <p:txBody>
+          <a:bodyPr/>
+          <a:lstStyle/>
+          <a:p>
+            <a:r>
+              <a:rPr lang="pt-BR"/>
+              <a:t>Nome do Apresentador - email</a:t>
+            </a:r>
+            <a:endParaRPr lang="pt-BR" dirty="0"/>
+          </a:p>
+        </p:txBody>
+      </p:sp>
+      <p:sp>
+        <p:nvSpPr>
+          <p:cNvPr id="5" name="Footer Placeholder 4">
+            <a:extLst>
+              <a:ext uri="{FF2B5EF4-FFF2-40B4-BE49-F238E27FC236}">
+                <a16:creationId xmlns:a16="http://schemas.microsoft.com/office/drawing/2014/main" id="{8AA0FFBD-7651-4269-9653-4098295EE79C}"/>
+              </a:ext>
+            </a:extLst>
+          </p:cNvPr>
+          <p:cNvSpPr>
+            <a:spLocks noGrp="1"/>
+          </p:cNvSpPr>
+          <p:nvPr>
+            <p:ph type="ftr" sz="quarter" idx="11"/>
+          </p:nvPr>
+        </p:nvSpPr>
+        <p:spPr>
+          <a:xfrm>
+            <a:off x="4038600" y="6356350"/>
+            <a:ext cx="4114800" cy="365125"/>
+          </a:xfrm>
+        </p:spPr>
+        <p:txBody>
+          <a:bodyPr/>
+          <a:lstStyle/>
+          <a:p>
+            <a:r>
+              <a:rPr lang="pt-BR"/>
+              <a:t>Título da apresentação</a:t>
+            </a:r>
+            <a:endParaRPr lang="pt-BR" dirty="0"/>
+          </a:p>
+        </p:txBody>
+      </p:sp>
+      <p:sp>
+        <p:nvSpPr>
+          <p:cNvPr id="6" name="Slide Number Placeholder 5">
+            <a:extLst>
+              <a:ext uri="{FF2B5EF4-FFF2-40B4-BE49-F238E27FC236}">
+                <a16:creationId xmlns:a16="http://schemas.microsoft.com/office/drawing/2014/main" id="{5A9C589F-A23D-4FE6-8623-E197ED8DA27C}"/>
+              </a:ext>
+            </a:extLst>
+          </p:cNvPr>
+          <p:cNvSpPr>
+            <a:spLocks noGrp="1"/>
+          </p:cNvSpPr>
+          <p:nvPr>
+            <p:ph type="sldNum" sz="quarter" idx="12"/>
+          </p:nvPr>
+        </p:nvSpPr>
+        <p:spPr>
+          <a:xfrm>
+            <a:off x="8801100" y="6350138"/>
+            <a:ext cx="2743200" cy="365125"/>
+          </a:xfrm>
+        </p:spPr>
+        <p:txBody>
+          <a:bodyPr/>
+          <a:lstStyle/>
+          <a:p>
+            <a:fld id="{943EB55C-D1D3-4EA7-96FF-7B21F10BDCBD}" type="slidenum">
+              <a:rPr lang="pt-BR" smtClean="0"/>
+              <a:pPr/>
+              <a:t>12</a:t>
+            </a:fld>
+            <a:endParaRPr lang="pt-BR" dirty="0"/>
+          </a:p>
+        </p:txBody>
+      </p:sp>
+    </p:spTree>
+    <p:extLst>
+      <p:ext uri="{BB962C8B-B14F-4D97-AF65-F5344CB8AC3E}">
+        <p14:creationId xmlns:p14="http://schemas.microsoft.com/office/powerpoint/2010/main" val="833673590"/>
+      </p:ext>
+    </p:extLst>
+  </p:cSld>
+  <p:clrMapOvr>
+    <a:masterClrMapping/>
+  </p:clrMapOvr>
+</p:sld>
+</file>
+
+<file path=ppt/slides/slide13.xml><?xml version="1.0" encoding="utf-8"?>
+<p:sld xmlns:a="http://schemas.openxmlformats.org/drawingml/2006/main" xmlns:r="http://schemas.openxmlformats.org/officeDocument/2006/relationships" xmlns:p="http://schemas.openxmlformats.org/presentationml/2006/main">
+  <p:cSld>
+    <p:spTree>
+      <p:nvGrpSpPr>
+        <p:cNvPr id="1" name=""/>
+        <p:cNvGrpSpPr/>
+        <p:nvPr/>
+      </p:nvGrpSpPr>
+      <p:grpSpPr>
+        <a:xfrm>
+          <a:off x="0" y="0"/>
+          <a:ext cx="0" cy="0"/>
+          <a:chOff x="0" y="0"/>
+          <a:chExt cx="0" cy="0"/>
+        </a:xfrm>
+      </p:grpSpPr>
+      <p:sp>
+        <p:nvSpPr>
+          <p:cNvPr id="7" name="Title 6">
+            <a:extLst>
+              <a:ext uri="{FF2B5EF4-FFF2-40B4-BE49-F238E27FC236}">
+                <a16:creationId xmlns:a16="http://schemas.microsoft.com/office/drawing/2014/main" id="{9CC6423C-8458-46DA-B904-ACDE246A1D10}"/>
+              </a:ext>
+            </a:extLst>
+          </p:cNvPr>
+          <p:cNvSpPr>
+            <a:spLocks noGrp="1"/>
+          </p:cNvSpPr>
+          <p:nvPr>
+            <p:ph type="title"/>
+          </p:nvPr>
+        </p:nvSpPr>
+        <p:spPr>
+          <a:xfrm>
+            <a:off x="831850" y="1709738"/>
+            <a:ext cx="10515600" cy="2852737"/>
+          </a:xfrm>
+        </p:spPr>
+        <p:txBody>
+          <a:bodyPr/>
+          <a:lstStyle/>
+          <a:p>
+            <a:r>
+              <a:rPr lang="pt-BR" dirty="0"/>
+              <a:t>Conclusão</a:t>
+            </a:r>
+          </a:p>
+        </p:txBody>
+      </p:sp>
+      <p:sp>
+        <p:nvSpPr>
+          <p:cNvPr id="13" name="Text Placeholder 12">
+            <a:extLst>
+              <a:ext uri="{FF2B5EF4-FFF2-40B4-BE49-F238E27FC236}">
+                <a16:creationId xmlns:a16="http://schemas.microsoft.com/office/drawing/2014/main" id="{B30C2ED5-76F3-4F62-A6AA-A6FBD0AB33B6}"/>
+              </a:ext>
+            </a:extLst>
+          </p:cNvPr>
+          <p:cNvSpPr>
+            <a:spLocks noGrp="1"/>
+          </p:cNvSpPr>
+          <p:nvPr>
+            <p:ph type="body" idx="1"/>
+          </p:nvPr>
+        </p:nvSpPr>
+        <p:spPr/>
+        <p:txBody>
+          <a:bodyPr/>
+          <a:lstStyle/>
+          <a:p>
+            <a:endParaRPr lang="pt-BR"/>
+          </a:p>
+        </p:txBody>
+      </p:sp>
+      <p:sp>
+        <p:nvSpPr>
+          <p:cNvPr id="4" name="Date Placeholder 3">
+            <a:extLst>
+              <a:ext uri="{FF2B5EF4-FFF2-40B4-BE49-F238E27FC236}">
+                <a16:creationId xmlns:a16="http://schemas.microsoft.com/office/drawing/2014/main" id="{7C5D03F3-4FCC-4BAA-987F-D7F5F97D7EA1}"/>
+              </a:ext>
+            </a:extLst>
+          </p:cNvPr>
+          <p:cNvSpPr>
+            <a:spLocks noGrp="1"/>
+          </p:cNvSpPr>
+          <p:nvPr>
+            <p:ph type="dt" sz="half" idx="10"/>
+          </p:nvPr>
+        </p:nvSpPr>
+        <p:spPr>
+          <a:xfrm>
+            <a:off x="156557" y="6350138"/>
+            <a:ext cx="2743200" cy="365125"/>
+          </a:xfrm>
+        </p:spPr>
+        <p:txBody>
+          <a:bodyPr/>
+          <a:lstStyle/>
+          <a:p>
+            <a:r>
+              <a:rPr lang="pt-BR"/>
+              <a:t>Nome do Apresentador - email</a:t>
+            </a:r>
+            <a:endParaRPr lang="pt-BR" dirty="0"/>
+          </a:p>
+        </p:txBody>
+      </p:sp>
+      <p:sp>
+        <p:nvSpPr>
+          <p:cNvPr id="5" name="Footer Placeholder 4">
+            <a:extLst>
+              <a:ext uri="{FF2B5EF4-FFF2-40B4-BE49-F238E27FC236}">
+                <a16:creationId xmlns:a16="http://schemas.microsoft.com/office/drawing/2014/main" id="{6D958900-CEE3-43FE-A1A6-0F5416100DBF}"/>
+              </a:ext>
+            </a:extLst>
+          </p:cNvPr>
+          <p:cNvSpPr>
+            <a:spLocks noGrp="1"/>
+          </p:cNvSpPr>
+          <p:nvPr>
+            <p:ph type="ftr" sz="quarter" idx="11"/>
+          </p:nvPr>
+        </p:nvSpPr>
+        <p:spPr>
+          <a:xfrm>
+            <a:off x="4038600" y="6356350"/>
+            <a:ext cx="4114800" cy="365125"/>
+          </a:xfrm>
+        </p:spPr>
+        <p:txBody>
+          <a:bodyPr/>
+          <a:lstStyle/>
+          <a:p>
+            <a:r>
+              <a:rPr lang="pt-BR"/>
+              <a:t>Título da apresentação</a:t>
+            </a:r>
+            <a:endParaRPr lang="pt-BR" dirty="0"/>
+          </a:p>
+        </p:txBody>
+      </p:sp>
+      <p:sp>
+        <p:nvSpPr>
+          <p:cNvPr id="6" name="Slide Number Placeholder 5">
+            <a:extLst>
+              <a:ext uri="{FF2B5EF4-FFF2-40B4-BE49-F238E27FC236}">
+                <a16:creationId xmlns:a16="http://schemas.microsoft.com/office/drawing/2014/main" id="{26F4D796-AF50-49B2-A75A-AE182D8637CC}"/>
+              </a:ext>
+            </a:extLst>
+          </p:cNvPr>
+          <p:cNvSpPr>
+            <a:spLocks noGrp="1"/>
+          </p:cNvSpPr>
+          <p:nvPr>
+            <p:ph type="sldNum" sz="quarter" idx="12"/>
+          </p:nvPr>
+        </p:nvSpPr>
+        <p:spPr>
+          <a:xfrm>
+            <a:off x="8801100" y="6350138"/>
+            <a:ext cx="2743200" cy="365125"/>
+          </a:xfrm>
+        </p:spPr>
+        <p:txBody>
+          <a:bodyPr/>
+          <a:lstStyle/>
+          <a:p>
+            <a:fld id="{943EB55C-D1D3-4EA7-96FF-7B21F10BDCBD}" type="slidenum">
+              <a:rPr lang="pt-BR" smtClean="0"/>
+              <a:pPr/>
+              <a:t>13</a:t>
+            </a:fld>
+            <a:endParaRPr lang="pt-BR" dirty="0"/>
+          </a:p>
+        </p:txBody>
+      </p:sp>
+    </p:spTree>
+    <p:extLst>
+      <p:ext uri="{BB962C8B-B14F-4D97-AF65-F5344CB8AC3E}">
+        <p14:creationId xmlns:p14="http://schemas.microsoft.com/office/powerpoint/2010/main" val="1960573890"/>
+      </p:ext>
+    </p:extLst>
+  </p:cSld>
+  <p:clrMapOvr>
+    <a:masterClrMapping/>
+  </p:clrMapOvr>
+</p:sld>
+</file>
+
+<file path=ppt/slides/slide14.xml><?xml version="1.0" encoding="utf-8"?>
+<p:sld xmlns:a="http://schemas.openxmlformats.org/drawingml/2006/main" xmlns:r="http://schemas.openxmlformats.org/officeDocument/2006/relationships" xmlns:p="http://schemas.openxmlformats.org/presentationml/2006/main">
+  <p:cSld>
+    <p:spTree>
+      <p:nvGrpSpPr>
+        <p:cNvPr id="1" name=""/>
+        <p:cNvGrpSpPr/>
+        <p:nvPr/>
+      </p:nvGrpSpPr>
+      <p:grpSpPr>
+        <a:xfrm>
+          <a:off x="0" y="0"/>
+          <a:ext cx="0" cy="0"/>
+          <a:chOff x="0" y="0"/>
+          <a:chExt cx="0" cy="0"/>
+        </a:xfrm>
+      </p:grpSpPr>
+      <p:sp>
+        <p:nvSpPr>
+          <p:cNvPr id="13" name="Content Placeholder 12">
+            <a:extLst>
+              <a:ext uri="{FF2B5EF4-FFF2-40B4-BE49-F238E27FC236}">
+                <a16:creationId xmlns:a16="http://schemas.microsoft.com/office/drawing/2014/main" id="{B6B46987-6570-415B-8F92-54BD5CC6781C}"/>
+              </a:ext>
+            </a:extLst>
+          </p:cNvPr>
+          <p:cNvSpPr>
+            <a:spLocks noGrp="1"/>
+          </p:cNvSpPr>
+          <p:nvPr>
+            <p:ph idx="1"/>
+          </p:nvPr>
+        </p:nvSpPr>
+        <p:spPr/>
+        <p:txBody>
+          <a:bodyPr/>
+          <a:lstStyle/>
+          <a:p>
+            <a:endParaRPr lang="pt-BR"/>
+          </a:p>
+        </p:txBody>
+      </p:sp>
+      <p:sp>
+        <p:nvSpPr>
+          <p:cNvPr id="7" name="Title 6">
+            <a:extLst>
+              <a:ext uri="{FF2B5EF4-FFF2-40B4-BE49-F238E27FC236}">
+                <a16:creationId xmlns:a16="http://schemas.microsoft.com/office/drawing/2014/main" id="{CEFC600F-5C28-49BA-96C4-7E0B3DEE9C26}"/>
+              </a:ext>
+            </a:extLst>
+          </p:cNvPr>
+          <p:cNvSpPr>
+            <a:spLocks noGrp="1"/>
+          </p:cNvSpPr>
+          <p:nvPr>
+            <p:ph type="title"/>
+          </p:nvPr>
+        </p:nvSpPr>
+        <p:spPr>
+          <a:xfrm>
+            <a:off x="1155469" y="66183"/>
+            <a:ext cx="10914610" cy="1334336"/>
+          </a:xfrm>
+        </p:spPr>
+        <p:txBody>
+          <a:bodyPr/>
+          <a:lstStyle/>
+          <a:p>
+            <a:r>
+              <a:rPr lang="pt-BR" dirty="0"/>
+              <a:t>Conclusão</a:t>
+            </a:r>
+          </a:p>
+        </p:txBody>
+      </p:sp>
+      <p:sp>
+        <p:nvSpPr>
+          <p:cNvPr id="4" name="Date Placeholder 3">
+            <a:extLst>
+              <a:ext uri="{FF2B5EF4-FFF2-40B4-BE49-F238E27FC236}">
+                <a16:creationId xmlns:a16="http://schemas.microsoft.com/office/drawing/2014/main" id="{66EAB9D3-2A09-491C-8833-02AB09A1EE2D}"/>
+              </a:ext>
+            </a:extLst>
+          </p:cNvPr>
+          <p:cNvSpPr>
+            <a:spLocks noGrp="1"/>
+          </p:cNvSpPr>
+          <p:nvPr>
+            <p:ph type="dt" sz="half" idx="10"/>
+          </p:nvPr>
+        </p:nvSpPr>
+        <p:spPr>
+          <a:xfrm>
+            <a:off x="156557" y="6350138"/>
+            <a:ext cx="2743200" cy="365125"/>
+          </a:xfrm>
+        </p:spPr>
+        <p:txBody>
+          <a:bodyPr/>
+          <a:lstStyle/>
+          <a:p>
+            <a:r>
+              <a:rPr lang="pt-BR"/>
+              <a:t>Nome do Apresentador - email</a:t>
+            </a:r>
+            <a:endParaRPr lang="pt-BR" dirty="0"/>
+          </a:p>
+        </p:txBody>
+      </p:sp>
+      <p:sp>
+        <p:nvSpPr>
+          <p:cNvPr id="5" name="Footer Placeholder 4">
+            <a:extLst>
+              <a:ext uri="{FF2B5EF4-FFF2-40B4-BE49-F238E27FC236}">
+                <a16:creationId xmlns:a16="http://schemas.microsoft.com/office/drawing/2014/main" id="{8AA0FFBD-7651-4269-9653-4098295EE79C}"/>
+              </a:ext>
+            </a:extLst>
+          </p:cNvPr>
+          <p:cNvSpPr>
+            <a:spLocks noGrp="1"/>
+          </p:cNvSpPr>
+          <p:nvPr>
+            <p:ph type="ftr" sz="quarter" idx="11"/>
+          </p:nvPr>
+        </p:nvSpPr>
+        <p:spPr>
+          <a:xfrm>
+            <a:off x="4038600" y="6356350"/>
+            <a:ext cx="4114800" cy="365125"/>
+          </a:xfrm>
+        </p:spPr>
+        <p:txBody>
+          <a:bodyPr/>
+          <a:lstStyle/>
+          <a:p>
+            <a:r>
+              <a:rPr lang="pt-BR"/>
+              <a:t>Título da apresentação</a:t>
+            </a:r>
+            <a:endParaRPr lang="pt-BR" dirty="0"/>
+          </a:p>
+        </p:txBody>
+      </p:sp>
+      <p:sp>
+        <p:nvSpPr>
+          <p:cNvPr id="6" name="Slide Number Placeholder 5">
+            <a:extLst>
+              <a:ext uri="{FF2B5EF4-FFF2-40B4-BE49-F238E27FC236}">
+                <a16:creationId xmlns:a16="http://schemas.microsoft.com/office/drawing/2014/main" id="{5A9C589F-A23D-4FE6-8623-E197ED8DA27C}"/>
+              </a:ext>
+            </a:extLst>
+          </p:cNvPr>
+          <p:cNvSpPr>
+            <a:spLocks noGrp="1"/>
+          </p:cNvSpPr>
+          <p:nvPr>
+            <p:ph type="sldNum" sz="quarter" idx="12"/>
+          </p:nvPr>
+        </p:nvSpPr>
+        <p:spPr>
+          <a:xfrm>
+            <a:off x="8801100" y="6350138"/>
+            <a:ext cx="2743200" cy="365125"/>
+          </a:xfrm>
+        </p:spPr>
+        <p:txBody>
+          <a:bodyPr/>
+          <a:lstStyle/>
+          <a:p>
+            <a:fld id="{943EB55C-D1D3-4EA7-96FF-7B21F10BDCBD}" type="slidenum">
+              <a:rPr lang="pt-BR" smtClean="0"/>
+              <a:pPr/>
+              <a:t>14</a:t>
+            </a:fld>
+            <a:endParaRPr lang="pt-BR" dirty="0"/>
+          </a:p>
+        </p:txBody>
+      </p:sp>
+    </p:spTree>
+    <p:extLst>
+      <p:ext uri="{BB962C8B-B14F-4D97-AF65-F5344CB8AC3E}">
+        <p14:creationId xmlns:p14="http://schemas.microsoft.com/office/powerpoint/2010/main" val="2371622552"/>
+      </p:ext>
+    </p:extLst>
+  </p:cSld>
+  <p:clrMapOvr>
+    <a:masterClrMapping/>
+  </p:clrMapOvr>
+</p:sld>
+</file>
+
+<file path=ppt/slides/slide15.xml><?xml version="1.0" encoding="utf-8"?>
+<p:sld xmlns:a="http://schemas.openxmlformats.org/drawingml/2006/main" xmlns:r="http://schemas.openxmlformats.org/officeDocument/2006/relationships" xmlns:p="http://schemas.openxmlformats.org/presentationml/2006/main">
+  <p:cSld>
+    <p:spTree>
+      <p:nvGrpSpPr>
+        <p:cNvPr id="1" name=""/>
+        <p:cNvGrpSpPr/>
+        <p:nvPr/>
+      </p:nvGrpSpPr>
+      <p:grpSpPr>
+        <a:xfrm>
+          <a:off x="0" y="0"/>
+          <a:ext cx="0" cy="0"/>
+          <a:chOff x="0" y="0"/>
+          <a:chExt cx="0" cy="0"/>
+        </a:xfrm>
+      </p:grpSpPr>
+      <p:sp>
+        <p:nvSpPr>
+          <p:cNvPr id="2" name="Title 1">
+            <a:extLst>
+              <a:ext uri="{FF2B5EF4-FFF2-40B4-BE49-F238E27FC236}">
+                <a16:creationId xmlns:a16="http://schemas.microsoft.com/office/drawing/2014/main" id="{E4440357-E8E4-4C41-A8A0-7FD4B3E5BF09}"/>
+              </a:ext>
+            </a:extLst>
+          </p:cNvPr>
+          <p:cNvSpPr>
+            <a:spLocks noGrp="1"/>
+          </p:cNvSpPr>
+          <p:nvPr>
+            <p:ph type="ctrTitle"/>
+          </p:nvPr>
+        </p:nvSpPr>
+        <p:spPr/>
+        <p:txBody>
+          <a:bodyPr/>
+          <a:lstStyle/>
+          <a:p>
+            <a:r>
+              <a:rPr lang="pt-BR" dirty="0"/>
+              <a:t>FIM</a:t>
+            </a:r>
+          </a:p>
+        </p:txBody>
+      </p:sp>
+      <p:sp>
+        <p:nvSpPr>
+          <p:cNvPr id="7" name="Subtitle 6">
+            <a:extLst>
+              <a:ext uri="{FF2B5EF4-FFF2-40B4-BE49-F238E27FC236}">
+                <a16:creationId xmlns:a16="http://schemas.microsoft.com/office/drawing/2014/main" id="{685C172B-D2B8-4FBF-B950-491F48221CE4}"/>
+              </a:ext>
+            </a:extLst>
+          </p:cNvPr>
+          <p:cNvSpPr>
+            <a:spLocks noGrp="1"/>
+          </p:cNvSpPr>
+          <p:nvPr>
+            <p:ph type="subTitle" idx="1"/>
+          </p:nvPr>
+        </p:nvSpPr>
+        <p:spPr/>
+        <p:txBody>
+          <a:bodyPr/>
+          <a:lstStyle/>
+          <a:p>
+            <a:r>
+              <a:rPr lang="pt-BR" dirty="0"/>
+              <a:t>Obrigado pela sua atenção</a:t>
+            </a:r>
+          </a:p>
+        </p:txBody>
+      </p:sp>
+    </p:spTree>
+    <p:extLst>
+      <p:ext uri="{BB962C8B-B14F-4D97-AF65-F5344CB8AC3E}">
+        <p14:creationId xmlns:p14="http://schemas.microsoft.com/office/powerpoint/2010/main" val="1168007158"/>
+      </p:ext>
+    </p:extLst>
+  </p:cSld>
+  <p:clrMapOvr>
+    <a:masterClrMapping/>
+  </p:clrMapOvr>
+</p:sld>
+</file>
+
+<file path=ppt/slides/slide16.xml><?xml version="1.0" encoding="utf-8"?>
+<p:sld xmlns:a="http://schemas.openxmlformats.org/drawingml/2006/main" xmlns:r="http://schemas.openxmlformats.org/officeDocument/2006/relationships" xmlns:p="http://schemas.openxmlformats.org/presentationml/2006/main">
+  <p:cSld>
+    <p:spTree>
+      <p:nvGrpSpPr>
+        <p:cNvPr id="1" name=""/>
+        <p:cNvGrpSpPr/>
+        <p:nvPr/>
+      </p:nvGrpSpPr>
+      <p:grpSpPr>
+        <a:xfrm>
+          <a:off x="0" y="0"/>
+          <a:ext cx="0" cy="0"/>
+          <a:chOff x="0" y="0"/>
+          <a:chExt cx="0" cy="0"/>
+        </a:xfrm>
+      </p:grpSpPr>
+      <p:sp>
+        <p:nvSpPr>
+          <p:cNvPr id="2" name="Content Placeholder 1">
+            <a:extLst>
+              <a:ext uri="{FF2B5EF4-FFF2-40B4-BE49-F238E27FC236}">
+                <a16:creationId xmlns:a16="http://schemas.microsoft.com/office/drawing/2014/main" id="{193CE735-268C-49CA-A208-61438814D048}"/>
+              </a:ext>
+            </a:extLst>
+          </p:cNvPr>
+          <p:cNvSpPr>
+            <a:spLocks noGrp="1"/>
+          </p:cNvSpPr>
+          <p:nvPr>
+            <p:ph idx="1"/>
+          </p:nvPr>
+        </p:nvSpPr>
+        <p:spPr/>
+        <p:txBody>
+          <a:bodyPr>
+            <a:normAutofit/>
+          </a:bodyPr>
+          <a:lstStyle/>
+          <a:p>
+            <a:pPr marL="0" indent="0">
+              <a:buNone/>
+            </a:pPr>
+            <a:br>
+              <a:rPr lang="pt-BR" dirty="0"/>
+            </a:br>
+            <a:br>
+              <a:rPr lang="en-US" dirty="0"/>
+            </a:br>
+            <a:br>
+              <a:rPr lang="pt-BR" dirty="0"/>
+            </a:br>
+            <a:br>
+              <a:rPr lang="en-US" dirty="0"/>
+            </a:br>
+            <a:endParaRPr lang="pt-BR" dirty="0"/>
+          </a:p>
+        </p:txBody>
+      </p:sp>
+      <p:sp>
+        <p:nvSpPr>
+          <p:cNvPr id="3" name="Date Placeholder 2">
+            <a:extLst>
+              <a:ext uri="{FF2B5EF4-FFF2-40B4-BE49-F238E27FC236}">
+                <a16:creationId xmlns:a16="http://schemas.microsoft.com/office/drawing/2014/main" id="{1E041F24-A551-4DA9-A57B-8EB7510248F4}"/>
+              </a:ext>
+            </a:extLst>
+          </p:cNvPr>
+          <p:cNvSpPr>
+            <a:spLocks noGrp="1"/>
+          </p:cNvSpPr>
+          <p:nvPr>
+            <p:ph type="dt" sz="half" idx="10"/>
+          </p:nvPr>
+        </p:nvSpPr>
+        <p:spPr>
+          <a:xfrm>
+            <a:off x="156557" y="6350138"/>
+            <a:ext cx="2743200" cy="365125"/>
+          </a:xfrm>
+        </p:spPr>
+        <p:txBody>
+          <a:bodyPr/>
+          <a:lstStyle/>
+          <a:p>
+            <a:r>
+              <a:rPr lang="pt-BR"/>
+              <a:t>Nome do Apresentador - email</a:t>
+            </a:r>
+            <a:endParaRPr lang="pt-BR" dirty="0"/>
+          </a:p>
+        </p:txBody>
+      </p:sp>
+      <p:sp>
+        <p:nvSpPr>
+          <p:cNvPr id="4" name="Footer Placeholder 3">
+            <a:extLst>
+              <a:ext uri="{FF2B5EF4-FFF2-40B4-BE49-F238E27FC236}">
+                <a16:creationId xmlns:a16="http://schemas.microsoft.com/office/drawing/2014/main" id="{52E340FC-EBFF-4D9F-9C13-ED8E3DA7BDEF}"/>
+              </a:ext>
+            </a:extLst>
+          </p:cNvPr>
+          <p:cNvSpPr>
+            <a:spLocks noGrp="1"/>
+          </p:cNvSpPr>
+          <p:nvPr>
+            <p:ph type="ftr" sz="quarter" idx="11"/>
+          </p:nvPr>
+        </p:nvSpPr>
+        <p:spPr>
+          <a:xfrm>
+            <a:off x="4038600" y="6356350"/>
+            <a:ext cx="4114800" cy="365125"/>
+          </a:xfrm>
+        </p:spPr>
+        <p:txBody>
+          <a:bodyPr/>
+          <a:lstStyle/>
+          <a:p>
+            <a:r>
+              <a:rPr lang="pt-BR"/>
+              <a:t>Título da apresentação</a:t>
+            </a:r>
+          </a:p>
+        </p:txBody>
+      </p:sp>
+      <p:sp>
+        <p:nvSpPr>
+          <p:cNvPr id="5" name="Slide Number Placeholder 4">
+            <a:extLst>
+              <a:ext uri="{FF2B5EF4-FFF2-40B4-BE49-F238E27FC236}">
+                <a16:creationId xmlns:a16="http://schemas.microsoft.com/office/drawing/2014/main" id="{B9CD2917-F205-4C16-B32C-83826DA4CA4F}"/>
+              </a:ext>
+            </a:extLst>
+          </p:cNvPr>
+          <p:cNvSpPr>
+            <a:spLocks noGrp="1"/>
+          </p:cNvSpPr>
+          <p:nvPr>
+            <p:ph type="sldNum" sz="quarter" idx="12"/>
+          </p:nvPr>
+        </p:nvSpPr>
+        <p:spPr>
+          <a:xfrm>
+            <a:off x="9326879" y="6356350"/>
+            <a:ext cx="2743200" cy="365125"/>
+          </a:xfrm>
+        </p:spPr>
+        <p:txBody>
+          <a:bodyPr/>
+          <a:lstStyle/>
+          <a:p>
+            <a:fld id="{943EB55C-D1D3-4EA7-96FF-7B21F10BDCBD}" type="slidenum">
+              <a:rPr lang="pt-BR" smtClean="0"/>
+              <a:pPr/>
+              <a:t>16</a:t>
+            </a:fld>
+            <a:endParaRPr lang="pt-BR" dirty="0"/>
+          </a:p>
+        </p:txBody>
+      </p:sp>
+      <p:sp>
+        <p:nvSpPr>
+          <p:cNvPr id="6" name="Title 5">
+            <a:extLst>
+              <a:ext uri="{FF2B5EF4-FFF2-40B4-BE49-F238E27FC236}">
+                <a16:creationId xmlns:a16="http://schemas.microsoft.com/office/drawing/2014/main" id="{3568EB69-5012-4688-9096-8DB84B16A9E4}"/>
+              </a:ext>
+            </a:extLst>
+          </p:cNvPr>
+          <p:cNvSpPr>
+            <a:spLocks noGrp="1"/>
+          </p:cNvSpPr>
+          <p:nvPr>
+            <p:ph type="title"/>
+          </p:nvPr>
+        </p:nvSpPr>
+        <p:spPr/>
+        <p:txBody>
+          <a:bodyPr/>
+          <a:lstStyle/>
+          <a:p>
+            <a:r>
+              <a:rPr lang="pt-BR" dirty="0"/>
+              <a:t>Bibliografia</a:t>
+            </a:r>
+          </a:p>
+        </p:txBody>
+      </p:sp>
+    </p:spTree>
+    <p:extLst>
+      <p:ext uri="{BB962C8B-B14F-4D97-AF65-F5344CB8AC3E}">
+        <p14:creationId xmlns:p14="http://schemas.microsoft.com/office/powerpoint/2010/main" val="2405647586"/>
+      </p:ext>
+    </p:extLst>
+  </p:cSld>
+  <p:clrMapOvr>
+    <a:masterClrMapping/>
+  </p:clrMapOvr>
+</p:sld>
+</file>
+
 <file path=ppt/slides/slide2.xml><?xml version="1.0" encoding="utf-8"?>
 <p:sld xmlns:a="http://schemas.openxmlformats.org/drawingml/2006/main" xmlns:r="http://schemas.openxmlformats.org/officeDocument/2006/relationships" xmlns:p="http://schemas.openxmlformats.org/presentationml/2006/main">
   <p:cSld>
@@ -5660,18 +6947,60 @@
       </p:grpSpPr>
       <p:sp>
         <p:nvSpPr>
-          <p:cNvPr id="2" name="Title 1">
-            <a:extLst>
-              <a:ext uri="{FF2B5EF4-FFF2-40B4-BE49-F238E27FC236}">
-                <a16:creationId xmlns:a16="http://schemas.microsoft.com/office/drawing/2014/main" id="{E4440357-E8E4-4C41-A8A0-7FD4B3E5BF09}"/>
-              </a:ext>
-            </a:extLst>
-          </p:cNvPr>
-          <p:cNvSpPr>
-            <a:spLocks noGrp="1"/>
-          </p:cNvSpPr>
-          <p:nvPr>
-            <p:ph type="ctrTitle"/>
+          <p:cNvPr id="7" name="Title 6">
+            <a:extLst>
+              <a:ext uri="{FF2B5EF4-FFF2-40B4-BE49-F238E27FC236}">
+                <a16:creationId xmlns:a16="http://schemas.microsoft.com/office/drawing/2014/main" id="{9CC6423C-8458-46DA-B904-ACDE246A1D10}"/>
+              </a:ext>
+            </a:extLst>
+          </p:cNvPr>
+          <p:cNvSpPr>
+            <a:spLocks noGrp="1"/>
+          </p:cNvSpPr>
+          <p:nvPr>
+            <p:ph type="title"/>
+          </p:nvPr>
+        </p:nvSpPr>
+        <p:spPr>
+          <a:xfrm>
+            <a:off x="831850" y="1709738"/>
+            <a:ext cx="10515600" cy="2852737"/>
+          </a:xfrm>
+        </p:spPr>
+        <p:txBody>
+          <a:bodyPr/>
+          <a:lstStyle/>
+          <a:p>
+            <a:r>
+              <a:rPr lang="pt-BR" dirty="0" err="1"/>
+              <a:t>AlexNet</a:t>
+            </a:r>
+            <a:r>
+              <a:rPr lang="pt-BR" dirty="0"/>
+              <a:t> e </a:t>
+            </a:r>
+            <a:r>
+              <a:rPr lang="pt-BR" dirty="0" err="1"/>
+              <a:t>ResNet</a:t>
+            </a:r>
+            <a:endParaRPr lang="pt-BR" dirty="0"/>
+          </a:p>
+        </p:txBody>
+      </p:sp>
+      <p:sp>
+        <p:nvSpPr>
+          <p:cNvPr id="13" name="Text Placeholder 12">
+            <a:extLst>
+              <a:ext uri="{FF2B5EF4-FFF2-40B4-BE49-F238E27FC236}">
+                <a16:creationId xmlns:a16="http://schemas.microsoft.com/office/drawing/2014/main" id="{B30C2ED5-76F3-4F62-A6AA-A6FBD0AB33B6}"/>
+              </a:ext>
+            </a:extLst>
+          </p:cNvPr>
+          <p:cNvSpPr>
+            <a:spLocks noGrp="1"/>
+          </p:cNvSpPr>
+          <p:nvPr>
+            <p:ph type="body" idx="1"/>
           </p:nvPr>
         </p:nvSpPr>
         <p:spPr/>
@@ -5679,45 +7008,117 @@
           <a:bodyPr/>
           <a:lstStyle/>
           <a:p>
-            <a:r>
-              <a:rPr lang="pt-BR" dirty="0"/>
-              <a:t>FIM</a:t>
-            </a:r>
-          </a:p>
-        </p:txBody>
-      </p:sp>
-      <p:sp>
-        <p:nvSpPr>
-          <p:cNvPr id="7" name="Subtitle 6">
-            <a:extLst>
-              <a:ext uri="{FF2B5EF4-FFF2-40B4-BE49-F238E27FC236}">
-                <a16:creationId xmlns:a16="http://schemas.microsoft.com/office/drawing/2014/main" id="{685C172B-D2B8-4FBF-B950-491F48221CE4}"/>
-              </a:ext>
-            </a:extLst>
-          </p:cNvPr>
-          <p:cNvSpPr>
-            <a:spLocks noGrp="1"/>
-          </p:cNvSpPr>
-          <p:nvPr>
-            <p:ph type="subTitle" idx="1"/>
-          </p:nvPr>
-        </p:nvSpPr>
-        <p:spPr/>
-        <p:txBody>
-          <a:bodyPr/>
-          <a:lstStyle/>
-          <a:p>
-            <a:r>
-              <a:rPr lang="pt-BR" dirty="0"/>
-              <a:t>Obrigado pela sua atenção</a:t>
-            </a:r>
+            <a:endParaRPr lang="pt-BR"/>
+          </a:p>
+        </p:txBody>
+      </p:sp>
+      <p:sp>
+        <p:nvSpPr>
+          <p:cNvPr id="4" name="Date Placeholder 3">
+            <a:extLst>
+              <a:ext uri="{FF2B5EF4-FFF2-40B4-BE49-F238E27FC236}">
+                <a16:creationId xmlns:a16="http://schemas.microsoft.com/office/drawing/2014/main" id="{7C5D03F3-4FCC-4BAA-987F-D7F5F97D7EA1}"/>
+              </a:ext>
+            </a:extLst>
+          </p:cNvPr>
+          <p:cNvSpPr>
+            <a:spLocks noGrp="1"/>
+          </p:cNvSpPr>
+          <p:nvPr>
+            <p:ph type="dt" sz="half" idx="10"/>
+          </p:nvPr>
+        </p:nvSpPr>
+        <p:spPr>
+          <a:xfrm>
+            <a:off x="156557" y="6350138"/>
+            <a:ext cx="2743200" cy="365125"/>
+          </a:xfrm>
+        </p:spPr>
+        <p:txBody>
+          <a:bodyPr/>
+          <a:lstStyle/>
+          <a:p>
+            <a:r>
+              <a:rPr lang="pt-BR"/>
+              <a:t>Nome do Apresentador - email</a:t>
+            </a:r>
+            <a:endParaRPr lang="pt-BR" dirty="0"/>
+          </a:p>
+        </p:txBody>
+      </p:sp>
+      <p:sp>
+        <p:nvSpPr>
+          <p:cNvPr id="5" name="Footer Placeholder 4">
+            <a:extLst>
+              <a:ext uri="{FF2B5EF4-FFF2-40B4-BE49-F238E27FC236}">
+                <a16:creationId xmlns:a16="http://schemas.microsoft.com/office/drawing/2014/main" id="{6D958900-CEE3-43FE-A1A6-0F5416100DBF}"/>
+              </a:ext>
+            </a:extLst>
+          </p:cNvPr>
+          <p:cNvSpPr>
+            <a:spLocks noGrp="1"/>
+          </p:cNvSpPr>
+          <p:nvPr>
+            <p:ph type="ftr" sz="quarter" idx="11"/>
+          </p:nvPr>
+        </p:nvSpPr>
+        <p:spPr>
+          <a:xfrm>
+            <a:off x="4038600" y="6356350"/>
+            <a:ext cx="4114800" cy="365125"/>
+          </a:xfrm>
+        </p:spPr>
+        <p:txBody>
+          <a:bodyPr/>
+          <a:lstStyle/>
+          <a:p>
+            <a:r>
+              <a:rPr lang="pt-BR"/>
+              <a:t>Título da apresentação</a:t>
+            </a:r>
+            <a:endParaRPr lang="pt-BR" dirty="0"/>
+          </a:p>
+        </p:txBody>
+      </p:sp>
+      <p:sp>
+        <p:nvSpPr>
+          <p:cNvPr id="6" name="Slide Number Placeholder 5">
+            <a:extLst>
+              <a:ext uri="{FF2B5EF4-FFF2-40B4-BE49-F238E27FC236}">
+                <a16:creationId xmlns:a16="http://schemas.microsoft.com/office/drawing/2014/main" id="{26F4D796-AF50-49B2-A75A-AE182D8637CC}"/>
+              </a:ext>
+            </a:extLst>
+          </p:cNvPr>
+          <p:cNvSpPr>
+            <a:spLocks noGrp="1"/>
+          </p:cNvSpPr>
+          <p:nvPr>
+            <p:ph type="sldNum" sz="quarter" idx="12"/>
+          </p:nvPr>
+        </p:nvSpPr>
+        <p:spPr>
+          <a:xfrm>
+            <a:off x="8801100" y="6350138"/>
+            <a:ext cx="2743200" cy="365125"/>
+          </a:xfrm>
+        </p:spPr>
+        <p:txBody>
+          <a:bodyPr/>
+          <a:lstStyle/>
+          <a:p>
+            <a:fld id="{943EB55C-D1D3-4EA7-96FF-7B21F10BDCBD}" type="slidenum">
+              <a:rPr lang="pt-BR" smtClean="0"/>
+              <a:pPr/>
+              <a:t>5</a:t>
+            </a:fld>
+            <a:endParaRPr lang="pt-BR" dirty="0"/>
           </a:p>
         </p:txBody>
       </p:sp>
     </p:spTree>
     <p:extLst>
       <p:ext uri="{BB962C8B-B14F-4D97-AF65-F5344CB8AC3E}">
-        <p14:creationId xmlns:p14="http://schemas.microsoft.com/office/powerpoint/2010/main" val="1168007158"/>
+        <p14:creationId xmlns:p14="http://schemas.microsoft.com/office/powerpoint/2010/main" val="2707637187"/>
       </p:ext>
     </p:extLst>
   </p:cSld>
@@ -5746,10 +7147,10 @@
       </p:grpSpPr>
       <p:sp>
         <p:nvSpPr>
-          <p:cNvPr id="2" name="Content Placeholder 1">
-            <a:extLst>
-              <a:ext uri="{FF2B5EF4-FFF2-40B4-BE49-F238E27FC236}">
-                <a16:creationId xmlns:a16="http://schemas.microsoft.com/office/drawing/2014/main" id="{193CE735-268C-49CA-A208-61438814D048}"/>
+          <p:cNvPr id="13" name="Content Placeholder 12">
+            <a:extLst>
+              <a:ext uri="{FF2B5EF4-FFF2-40B4-BE49-F238E27FC236}">
+                <a16:creationId xmlns:a16="http://schemas.microsoft.com/office/drawing/2014/main" id="{B6B46987-6570-415B-8F92-54BD5CC6781C}"/>
               </a:ext>
             </a:extLst>
           </p:cNvPr>
@@ -5762,36 +7163,61 @@
         </p:nvSpPr>
         <p:spPr/>
         <p:txBody>
-          <a:bodyPr>
-            <a:normAutofit/>
-          </a:bodyPr>
-          <a:lstStyle/>
-          <a:p>
-            <a:pPr marL="0" indent="0">
-              <a:buNone/>
-            </a:pPr>
-            <a:br>
+          <a:bodyPr/>
+          <a:lstStyle/>
+          <a:p>
+            <a:endParaRPr lang="pt-BR"/>
+          </a:p>
+        </p:txBody>
+      </p:sp>
+      <p:sp>
+        <p:nvSpPr>
+          <p:cNvPr id="7" name="Title 6">
+            <a:extLst>
+              <a:ext uri="{FF2B5EF4-FFF2-40B4-BE49-F238E27FC236}">
+                <a16:creationId xmlns:a16="http://schemas.microsoft.com/office/drawing/2014/main" id="{CEFC600F-5C28-49BA-96C4-7E0B3DEE9C26}"/>
+              </a:ext>
+            </a:extLst>
+          </p:cNvPr>
+          <p:cNvSpPr>
+            <a:spLocks noGrp="1"/>
+          </p:cNvSpPr>
+          <p:nvPr>
+            <p:ph type="title"/>
+          </p:nvPr>
+        </p:nvSpPr>
+        <p:spPr>
+          <a:xfrm>
+            <a:off x="1155469" y="66183"/>
+            <a:ext cx="10914610" cy="1334336"/>
+          </a:xfrm>
+        </p:spPr>
+        <p:txBody>
+          <a:bodyPr/>
+          <a:lstStyle/>
+          <a:p>
+            <a:r>
+              <a:rPr lang="pt-BR" dirty="0" err="1"/>
+              <a:t>AlexNet</a:t>
+            </a:r>
+            <a:r>
               <a:rPr lang="pt-BR" dirty="0"/>
-            </a:br>
-            <a:br>
-              <a:rPr lang="en-US" dirty="0"/>
-            </a:br>
-            <a:br>
-              <a:rPr lang="pt-BR" dirty="0"/>
-            </a:br>
-            <a:br>
-              <a:rPr lang="en-US" dirty="0"/>
-            </a:br>
+              <a:t> e </a:t>
+            </a:r>
+            <a:r>
+              <a:rPr lang="pt-BR" dirty="0" err="1"/>
+              <a:t>ResNet</a:t>
+            </a:r>
             <a:endParaRPr lang="pt-BR" dirty="0"/>
           </a:p>
         </p:txBody>
       </p:sp>
       <p:sp>
         <p:nvSpPr>
-          <p:cNvPr id="3" name="Date Placeholder 2">
-            <a:extLst>
-              <a:ext uri="{FF2B5EF4-FFF2-40B4-BE49-F238E27FC236}">
-                <a16:creationId xmlns:a16="http://schemas.microsoft.com/office/drawing/2014/main" id="{1E041F24-A551-4DA9-A57B-8EB7510248F4}"/>
+          <p:cNvPr id="4" name="Date Placeholder 3">
+            <a:extLst>
+              <a:ext uri="{FF2B5EF4-FFF2-40B4-BE49-F238E27FC236}">
+                <a16:creationId xmlns:a16="http://schemas.microsoft.com/office/drawing/2014/main" id="{66EAB9D3-2A09-491C-8833-02AB09A1EE2D}"/>
               </a:ext>
             </a:extLst>
           </p:cNvPr>
@@ -5822,10 +7248,10 @@
       </p:sp>
       <p:sp>
         <p:nvSpPr>
-          <p:cNvPr id="4" name="Footer Placeholder 3">
-            <a:extLst>
-              <a:ext uri="{FF2B5EF4-FFF2-40B4-BE49-F238E27FC236}">
-                <a16:creationId xmlns:a16="http://schemas.microsoft.com/office/drawing/2014/main" id="{52E340FC-EBFF-4D9F-9C13-ED8E3DA7BDEF}"/>
+          <p:cNvPr id="5" name="Footer Placeholder 4">
+            <a:extLst>
+              <a:ext uri="{FF2B5EF4-FFF2-40B4-BE49-F238E27FC236}">
+                <a16:creationId xmlns:a16="http://schemas.microsoft.com/office/drawing/2014/main" id="{8AA0FFBD-7651-4269-9653-4098295EE79C}"/>
               </a:ext>
             </a:extLst>
           </p:cNvPr>
@@ -5850,15 +7276,16 @@
               <a:rPr lang="pt-BR"/>
               <a:t>Título da apresentação</a:t>
             </a:r>
-          </a:p>
-        </p:txBody>
-      </p:sp>
-      <p:sp>
-        <p:nvSpPr>
-          <p:cNvPr id="5" name="Slide Number Placeholder 4">
-            <a:extLst>
-              <a:ext uri="{FF2B5EF4-FFF2-40B4-BE49-F238E27FC236}">
-                <a16:creationId xmlns:a16="http://schemas.microsoft.com/office/drawing/2014/main" id="{B9CD2917-F205-4C16-B32C-83826DA4CA4F}"/>
+            <a:endParaRPr lang="pt-BR" dirty="0"/>
+          </a:p>
+        </p:txBody>
+      </p:sp>
+      <p:sp>
+        <p:nvSpPr>
+          <p:cNvPr id="6" name="Slide Number Placeholder 5">
+            <a:extLst>
+              <a:ext uri="{FF2B5EF4-FFF2-40B4-BE49-F238E27FC236}">
+                <a16:creationId xmlns:a16="http://schemas.microsoft.com/office/drawing/2014/main" id="{5A9C589F-A23D-4FE6-8623-E197ED8DA27C}"/>
               </a:ext>
             </a:extLst>
           </p:cNvPr>
@@ -5871,7 +7298,7 @@
         </p:nvSpPr>
         <p:spPr>
           <a:xfrm>
-            <a:off x="9326879" y="6356350"/>
+            <a:off x="8801100" y="6350138"/>
             <a:ext cx="2743200" cy="365125"/>
           </a:xfrm>
         </p:spPr>
@@ -5888,38 +7315,583 @@
           </a:p>
         </p:txBody>
       </p:sp>
-      <p:sp>
-        <p:nvSpPr>
-          <p:cNvPr id="6" name="Title 5">
-            <a:extLst>
-              <a:ext uri="{FF2B5EF4-FFF2-40B4-BE49-F238E27FC236}">
-                <a16:creationId xmlns:a16="http://schemas.microsoft.com/office/drawing/2014/main" id="{3568EB69-5012-4688-9096-8DB84B16A9E4}"/>
-              </a:ext>
-            </a:extLst>
-          </p:cNvPr>
-          <p:cNvSpPr>
-            <a:spLocks noGrp="1"/>
-          </p:cNvSpPr>
-          <p:nvPr>
-            <p:ph type="title"/>
-          </p:nvPr>
-        </p:nvSpPr>
-        <p:spPr/>
-        <p:txBody>
-          <a:bodyPr/>
-          <a:lstStyle/>
-          <a:p>
-            <a:r>
-              <a:rPr lang="pt-BR" dirty="0"/>
-              <a:t>Bibliografia</a:t>
-            </a:r>
-          </a:p>
-        </p:txBody>
-      </p:sp>
     </p:spTree>
     <p:extLst>
       <p:ext uri="{BB962C8B-B14F-4D97-AF65-F5344CB8AC3E}">
-        <p14:creationId xmlns:p14="http://schemas.microsoft.com/office/powerpoint/2010/main" val="2405647586"/>
+        <p14:creationId xmlns:p14="http://schemas.microsoft.com/office/powerpoint/2010/main" val="2332174428"/>
+      </p:ext>
+    </p:extLst>
+  </p:cSld>
+  <p:clrMapOvr>
+    <a:masterClrMapping/>
+  </p:clrMapOvr>
+</p:sld>
+</file>
+
+<file path=ppt/slides/slide7.xml><?xml version="1.0" encoding="utf-8"?>
+<p:sld xmlns:a="http://schemas.openxmlformats.org/drawingml/2006/main" xmlns:r="http://schemas.openxmlformats.org/officeDocument/2006/relationships" xmlns:p="http://schemas.openxmlformats.org/presentationml/2006/main">
+  <p:cSld>
+    <p:spTree>
+      <p:nvGrpSpPr>
+        <p:cNvPr id="1" name=""/>
+        <p:cNvGrpSpPr/>
+        <p:nvPr/>
+      </p:nvGrpSpPr>
+      <p:grpSpPr>
+        <a:xfrm>
+          <a:off x="0" y="0"/>
+          <a:ext cx="0" cy="0"/>
+          <a:chOff x="0" y="0"/>
+          <a:chExt cx="0" cy="0"/>
+        </a:xfrm>
+      </p:grpSpPr>
+      <p:sp>
+        <p:nvSpPr>
+          <p:cNvPr id="7" name="Title 6">
+            <a:extLst>
+              <a:ext uri="{FF2B5EF4-FFF2-40B4-BE49-F238E27FC236}">
+                <a16:creationId xmlns:a16="http://schemas.microsoft.com/office/drawing/2014/main" id="{9CC6423C-8458-46DA-B904-ACDE246A1D10}"/>
+              </a:ext>
+            </a:extLst>
+          </p:cNvPr>
+          <p:cNvSpPr>
+            <a:spLocks noGrp="1"/>
+          </p:cNvSpPr>
+          <p:nvPr>
+            <p:ph type="title"/>
+          </p:nvPr>
+        </p:nvSpPr>
+        <p:spPr>
+          <a:xfrm>
+            <a:off x="831850" y="1709738"/>
+            <a:ext cx="10515600" cy="2852737"/>
+          </a:xfrm>
+        </p:spPr>
+        <p:txBody>
+          <a:bodyPr/>
+          <a:lstStyle/>
+          <a:p>
+            <a:r>
+              <a:rPr lang="pt-BR" dirty="0"/>
+              <a:t>Experimentos</a:t>
+            </a:r>
+          </a:p>
+        </p:txBody>
+      </p:sp>
+      <p:sp>
+        <p:nvSpPr>
+          <p:cNvPr id="13" name="Text Placeholder 12">
+            <a:extLst>
+              <a:ext uri="{FF2B5EF4-FFF2-40B4-BE49-F238E27FC236}">
+                <a16:creationId xmlns:a16="http://schemas.microsoft.com/office/drawing/2014/main" id="{B30C2ED5-76F3-4F62-A6AA-A6FBD0AB33B6}"/>
+              </a:ext>
+            </a:extLst>
+          </p:cNvPr>
+          <p:cNvSpPr>
+            <a:spLocks noGrp="1"/>
+          </p:cNvSpPr>
+          <p:nvPr>
+            <p:ph type="body" idx="1"/>
+          </p:nvPr>
+        </p:nvSpPr>
+        <p:spPr/>
+        <p:txBody>
+          <a:bodyPr/>
+          <a:lstStyle/>
+          <a:p>
+            <a:endParaRPr lang="pt-BR"/>
+          </a:p>
+        </p:txBody>
+      </p:sp>
+      <p:sp>
+        <p:nvSpPr>
+          <p:cNvPr id="4" name="Date Placeholder 3">
+            <a:extLst>
+              <a:ext uri="{FF2B5EF4-FFF2-40B4-BE49-F238E27FC236}">
+                <a16:creationId xmlns:a16="http://schemas.microsoft.com/office/drawing/2014/main" id="{7C5D03F3-4FCC-4BAA-987F-D7F5F97D7EA1}"/>
+              </a:ext>
+            </a:extLst>
+          </p:cNvPr>
+          <p:cNvSpPr>
+            <a:spLocks noGrp="1"/>
+          </p:cNvSpPr>
+          <p:nvPr>
+            <p:ph type="dt" sz="half" idx="10"/>
+          </p:nvPr>
+        </p:nvSpPr>
+        <p:spPr>
+          <a:xfrm>
+            <a:off x="156557" y="6350138"/>
+            <a:ext cx="2743200" cy="365125"/>
+          </a:xfrm>
+        </p:spPr>
+        <p:txBody>
+          <a:bodyPr/>
+          <a:lstStyle/>
+          <a:p>
+            <a:r>
+              <a:rPr lang="pt-BR"/>
+              <a:t>Nome do Apresentador - email</a:t>
+            </a:r>
+            <a:endParaRPr lang="pt-BR" dirty="0"/>
+          </a:p>
+        </p:txBody>
+      </p:sp>
+      <p:sp>
+        <p:nvSpPr>
+          <p:cNvPr id="5" name="Footer Placeholder 4">
+            <a:extLst>
+              <a:ext uri="{FF2B5EF4-FFF2-40B4-BE49-F238E27FC236}">
+                <a16:creationId xmlns:a16="http://schemas.microsoft.com/office/drawing/2014/main" id="{6D958900-CEE3-43FE-A1A6-0F5416100DBF}"/>
+              </a:ext>
+            </a:extLst>
+          </p:cNvPr>
+          <p:cNvSpPr>
+            <a:spLocks noGrp="1"/>
+          </p:cNvSpPr>
+          <p:nvPr>
+            <p:ph type="ftr" sz="quarter" idx="11"/>
+          </p:nvPr>
+        </p:nvSpPr>
+        <p:spPr>
+          <a:xfrm>
+            <a:off x="4038600" y="6356350"/>
+            <a:ext cx="4114800" cy="365125"/>
+          </a:xfrm>
+        </p:spPr>
+        <p:txBody>
+          <a:bodyPr/>
+          <a:lstStyle/>
+          <a:p>
+            <a:r>
+              <a:rPr lang="pt-BR"/>
+              <a:t>Título da apresentação</a:t>
+            </a:r>
+            <a:endParaRPr lang="pt-BR" dirty="0"/>
+          </a:p>
+        </p:txBody>
+      </p:sp>
+      <p:sp>
+        <p:nvSpPr>
+          <p:cNvPr id="6" name="Slide Number Placeholder 5">
+            <a:extLst>
+              <a:ext uri="{FF2B5EF4-FFF2-40B4-BE49-F238E27FC236}">
+                <a16:creationId xmlns:a16="http://schemas.microsoft.com/office/drawing/2014/main" id="{26F4D796-AF50-49B2-A75A-AE182D8637CC}"/>
+              </a:ext>
+            </a:extLst>
+          </p:cNvPr>
+          <p:cNvSpPr>
+            <a:spLocks noGrp="1"/>
+          </p:cNvSpPr>
+          <p:nvPr>
+            <p:ph type="sldNum" sz="quarter" idx="12"/>
+          </p:nvPr>
+        </p:nvSpPr>
+        <p:spPr>
+          <a:xfrm>
+            <a:off x="8801100" y="6350138"/>
+            <a:ext cx="2743200" cy="365125"/>
+          </a:xfrm>
+        </p:spPr>
+        <p:txBody>
+          <a:bodyPr/>
+          <a:lstStyle/>
+          <a:p>
+            <a:fld id="{943EB55C-D1D3-4EA7-96FF-7B21F10BDCBD}" type="slidenum">
+              <a:rPr lang="pt-BR" smtClean="0"/>
+              <a:pPr/>
+              <a:t>7</a:t>
+            </a:fld>
+            <a:endParaRPr lang="pt-BR" dirty="0"/>
+          </a:p>
+        </p:txBody>
+      </p:sp>
+    </p:spTree>
+    <p:extLst>
+      <p:ext uri="{BB962C8B-B14F-4D97-AF65-F5344CB8AC3E}">
+        <p14:creationId xmlns:p14="http://schemas.microsoft.com/office/powerpoint/2010/main" val="3342025902"/>
+      </p:ext>
+    </p:extLst>
+  </p:cSld>
+  <p:clrMapOvr>
+    <a:masterClrMapping/>
+  </p:clrMapOvr>
+</p:sld>
+</file>
+
+<file path=ppt/slides/slide8.xml><?xml version="1.0" encoding="utf-8"?>
+<p:sld xmlns:a="http://schemas.openxmlformats.org/drawingml/2006/main" xmlns:r="http://schemas.openxmlformats.org/officeDocument/2006/relationships" xmlns:p="http://schemas.openxmlformats.org/presentationml/2006/main">
+  <p:cSld>
+    <p:spTree>
+      <p:nvGrpSpPr>
+        <p:cNvPr id="1" name=""/>
+        <p:cNvGrpSpPr/>
+        <p:nvPr/>
+      </p:nvGrpSpPr>
+      <p:grpSpPr>
+        <a:xfrm>
+          <a:off x="0" y="0"/>
+          <a:ext cx="0" cy="0"/>
+          <a:chOff x="0" y="0"/>
+          <a:chExt cx="0" cy="0"/>
+        </a:xfrm>
+      </p:grpSpPr>
+      <p:sp>
+        <p:nvSpPr>
+          <p:cNvPr id="13" name="Content Placeholder 12">
+            <a:extLst>
+              <a:ext uri="{FF2B5EF4-FFF2-40B4-BE49-F238E27FC236}">
+                <a16:creationId xmlns:a16="http://schemas.microsoft.com/office/drawing/2014/main" id="{B6B46987-6570-415B-8F92-54BD5CC6781C}"/>
+              </a:ext>
+            </a:extLst>
+          </p:cNvPr>
+          <p:cNvSpPr>
+            <a:spLocks noGrp="1"/>
+          </p:cNvSpPr>
+          <p:nvPr>
+            <p:ph idx="1"/>
+          </p:nvPr>
+        </p:nvSpPr>
+        <p:spPr/>
+        <p:txBody>
+          <a:bodyPr/>
+          <a:lstStyle/>
+          <a:p>
+            <a:endParaRPr lang="pt-BR"/>
+          </a:p>
+        </p:txBody>
+      </p:sp>
+      <p:sp>
+        <p:nvSpPr>
+          <p:cNvPr id="7" name="Title 6">
+            <a:extLst>
+              <a:ext uri="{FF2B5EF4-FFF2-40B4-BE49-F238E27FC236}">
+                <a16:creationId xmlns:a16="http://schemas.microsoft.com/office/drawing/2014/main" id="{CEFC600F-5C28-49BA-96C4-7E0B3DEE9C26}"/>
+              </a:ext>
+            </a:extLst>
+          </p:cNvPr>
+          <p:cNvSpPr>
+            <a:spLocks noGrp="1"/>
+          </p:cNvSpPr>
+          <p:nvPr>
+            <p:ph type="title"/>
+          </p:nvPr>
+        </p:nvSpPr>
+        <p:spPr>
+          <a:xfrm>
+            <a:off x="1155469" y="66183"/>
+            <a:ext cx="10914610" cy="1334336"/>
+          </a:xfrm>
+        </p:spPr>
+        <p:txBody>
+          <a:bodyPr/>
+          <a:lstStyle/>
+          <a:p>
+            <a:r>
+              <a:rPr lang="pt-BR" dirty="0"/>
+              <a:t>Experimentos</a:t>
+            </a:r>
+          </a:p>
+        </p:txBody>
+      </p:sp>
+      <p:sp>
+        <p:nvSpPr>
+          <p:cNvPr id="4" name="Date Placeholder 3">
+            <a:extLst>
+              <a:ext uri="{FF2B5EF4-FFF2-40B4-BE49-F238E27FC236}">
+                <a16:creationId xmlns:a16="http://schemas.microsoft.com/office/drawing/2014/main" id="{66EAB9D3-2A09-491C-8833-02AB09A1EE2D}"/>
+              </a:ext>
+            </a:extLst>
+          </p:cNvPr>
+          <p:cNvSpPr>
+            <a:spLocks noGrp="1"/>
+          </p:cNvSpPr>
+          <p:nvPr>
+            <p:ph type="dt" sz="half" idx="10"/>
+          </p:nvPr>
+        </p:nvSpPr>
+        <p:spPr>
+          <a:xfrm>
+            <a:off x="156557" y="6350138"/>
+            <a:ext cx="2743200" cy="365125"/>
+          </a:xfrm>
+        </p:spPr>
+        <p:txBody>
+          <a:bodyPr/>
+          <a:lstStyle/>
+          <a:p>
+            <a:r>
+              <a:rPr lang="pt-BR"/>
+              <a:t>Nome do Apresentador - email</a:t>
+            </a:r>
+            <a:endParaRPr lang="pt-BR" dirty="0"/>
+          </a:p>
+        </p:txBody>
+      </p:sp>
+      <p:sp>
+        <p:nvSpPr>
+          <p:cNvPr id="5" name="Footer Placeholder 4">
+            <a:extLst>
+              <a:ext uri="{FF2B5EF4-FFF2-40B4-BE49-F238E27FC236}">
+                <a16:creationId xmlns:a16="http://schemas.microsoft.com/office/drawing/2014/main" id="{8AA0FFBD-7651-4269-9653-4098295EE79C}"/>
+              </a:ext>
+            </a:extLst>
+          </p:cNvPr>
+          <p:cNvSpPr>
+            <a:spLocks noGrp="1"/>
+          </p:cNvSpPr>
+          <p:nvPr>
+            <p:ph type="ftr" sz="quarter" idx="11"/>
+          </p:nvPr>
+        </p:nvSpPr>
+        <p:spPr>
+          <a:xfrm>
+            <a:off x="4038600" y="6356350"/>
+            <a:ext cx="4114800" cy="365125"/>
+          </a:xfrm>
+        </p:spPr>
+        <p:txBody>
+          <a:bodyPr/>
+          <a:lstStyle/>
+          <a:p>
+            <a:r>
+              <a:rPr lang="pt-BR"/>
+              <a:t>Título da apresentação</a:t>
+            </a:r>
+            <a:endParaRPr lang="pt-BR" dirty="0"/>
+          </a:p>
+        </p:txBody>
+      </p:sp>
+      <p:sp>
+        <p:nvSpPr>
+          <p:cNvPr id="6" name="Slide Number Placeholder 5">
+            <a:extLst>
+              <a:ext uri="{FF2B5EF4-FFF2-40B4-BE49-F238E27FC236}">
+                <a16:creationId xmlns:a16="http://schemas.microsoft.com/office/drawing/2014/main" id="{5A9C589F-A23D-4FE6-8623-E197ED8DA27C}"/>
+              </a:ext>
+            </a:extLst>
+          </p:cNvPr>
+          <p:cNvSpPr>
+            <a:spLocks noGrp="1"/>
+          </p:cNvSpPr>
+          <p:nvPr>
+            <p:ph type="sldNum" sz="quarter" idx="12"/>
+          </p:nvPr>
+        </p:nvSpPr>
+        <p:spPr>
+          <a:xfrm>
+            <a:off x="8801100" y="6350138"/>
+            <a:ext cx="2743200" cy="365125"/>
+          </a:xfrm>
+        </p:spPr>
+        <p:txBody>
+          <a:bodyPr/>
+          <a:lstStyle/>
+          <a:p>
+            <a:fld id="{943EB55C-D1D3-4EA7-96FF-7B21F10BDCBD}" type="slidenum">
+              <a:rPr lang="pt-BR" smtClean="0"/>
+              <a:pPr/>
+              <a:t>8</a:t>
+            </a:fld>
+            <a:endParaRPr lang="pt-BR" dirty="0"/>
+          </a:p>
+        </p:txBody>
+      </p:sp>
+    </p:spTree>
+    <p:extLst>
+      <p:ext uri="{BB962C8B-B14F-4D97-AF65-F5344CB8AC3E}">
+        <p14:creationId xmlns:p14="http://schemas.microsoft.com/office/powerpoint/2010/main" val="3156822045"/>
+      </p:ext>
+    </p:extLst>
+  </p:cSld>
+  <p:clrMapOvr>
+    <a:masterClrMapping/>
+  </p:clrMapOvr>
+</p:sld>
+</file>
+
+<file path=ppt/slides/slide9.xml><?xml version="1.0" encoding="utf-8"?>
+<p:sld xmlns:a="http://schemas.openxmlformats.org/drawingml/2006/main" xmlns:r="http://schemas.openxmlformats.org/officeDocument/2006/relationships" xmlns:p="http://schemas.openxmlformats.org/presentationml/2006/main">
+  <p:cSld>
+    <p:spTree>
+      <p:nvGrpSpPr>
+        <p:cNvPr id="1" name=""/>
+        <p:cNvGrpSpPr/>
+        <p:nvPr/>
+      </p:nvGrpSpPr>
+      <p:grpSpPr>
+        <a:xfrm>
+          <a:off x="0" y="0"/>
+          <a:ext cx="0" cy="0"/>
+          <a:chOff x="0" y="0"/>
+          <a:chExt cx="0" cy="0"/>
+        </a:xfrm>
+      </p:grpSpPr>
+      <p:sp>
+        <p:nvSpPr>
+          <p:cNvPr id="7" name="Title 6">
+            <a:extLst>
+              <a:ext uri="{FF2B5EF4-FFF2-40B4-BE49-F238E27FC236}">
+                <a16:creationId xmlns:a16="http://schemas.microsoft.com/office/drawing/2014/main" id="{9CC6423C-8458-46DA-B904-ACDE246A1D10}"/>
+              </a:ext>
+            </a:extLst>
+          </p:cNvPr>
+          <p:cNvSpPr>
+            <a:spLocks noGrp="1"/>
+          </p:cNvSpPr>
+          <p:nvPr>
+            <p:ph type="title"/>
+          </p:nvPr>
+        </p:nvSpPr>
+        <p:spPr>
+          <a:xfrm>
+            <a:off x="831850" y="1709738"/>
+            <a:ext cx="10515600" cy="2852737"/>
+          </a:xfrm>
+        </p:spPr>
+        <p:txBody>
+          <a:bodyPr/>
+          <a:lstStyle/>
+          <a:p>
+            <a:r>
+              <a:rPr lang="pt-BR" dirty="0"/>
+              <a:t>Resultados</a:t>
+            </a:r>
+          </a:p>
+        </p:txBody>
+      </p:sp>
+      <p:sp>
+        <p:nvSpPr>
+          <p:cNvPr id="13" name="Text Placeholder 12">
+            <a:extLst>
+              <a:ext uri="{FF2B5EF4-FFF2-40B4-BE49-F238E27FC236}">
+                <a16:creationId xmlns:a16="http://schemas.microsoft.com/office/drawing/2014/main" id="{B30C2ED5-76F3-4F62-A6AA-A6FBD0AB33B6}"/>
+              </a:ext>
+            </a:extLst>
+          </p:cNvPr>
+          <p:cNvSpPr>
+            <a:spLocks noGrp="1"/>
+          </p:cNvSpPr>
+          <p:nvPr>
+            <p:ph type="body" idx="1"/>
+          </p:nvPr>
+        </p:nvSpPr>
+        <p:spPr/>
+        <p:txBody>
+          <a:bodyPr/>
+          <a:lstStyle/>
+          <a:p>
+            <a:endParaRPr lang="pt-BR"/>
+          </a:p>
+        </p:txBody>
+      </p:sp>
+      <p:sp>
+        <p:nvSpPr>
+          <p:cNvPr id="4" name="Date Placeholder 3">
+            <a:extLst>
+              <a:ext uri="{FF2B5EF4-FFF2-40B4-BE49-F238E27FC236}">
+                <a16:creationId xmlns:a16="http://schemas.microsoft.com/office/drawing/2014/main" id="{7C5D03F3-4FCC-4BAA-987F-D7F5F97D7EA1}"/>
+              </a:ext>
+            </a:extLst>
+          </p:cNvPr>
+          <p:cNvSpPr>
+            <a:spLocks noGrp="1"/>
+          </p:cNvSpPr>
+          <p:nvPr>
+            <p:ph type="dt" sz="half" idx="10"/>
+          </p:nvPr>
+        </p:nvSpPr>
+        <p:spPr>
+          <a:xfrm>
+            <a:off x="156557" y="6350138"/>
+            <a:ext cx="2743200" cy="365125"/>
+          </a:xfrm>
+        </p:spPr>
+        <p:txBody>
+          <a:bodyPr/>
+          <a:lstStyle/>
+          <a:p>
+            <a:r>
+              <a:rPr lang="pt-BR"/>
+              <a:t>Nome do Apresentador - email</a:t>
+            </a:r>
+            <a:endParaRPr lang="pt-BR" dirty="0"/>
+          </a:p>
+        </p:txBody>
+      </p:sp>
+      <p:sp>
+        <p:nvSpPr>
+          <p:cNvPr id="5" name="Footer Placeholder 4">
+            <a:extLst>
+              <a:ext uri="{FF2B5EF4-FFF2-40B4-BE49-F238E27FC236}">
+                <a16:creationId xmlns:a16="http://schemas.microsoft.com/office/drawing/2014/main" id="{6D958900-CEE3-43FE-A1A6-0F5416100DBF}"/>
+              </a:ext>
+            </a:extLst>
+          </p:cNvPr>
+          <p:cNvSpPr>
+            <a:spLocks noGrp="1"/>
+          </p:cNvSpPr>
+          <p:nvPr>
+            <p:ph type="ftr" sz="quarter" idx="11"/>
+          </p:nvPr>
+        </p:nvSpPr>
+        <p:spPr>
+          <a:xfrm>
+            <a:off x="4038600" y="6356350"/>
+            <a:ext cx="4114800" cy="365125"/>
+          </a:xfrm>
+        </p:spPr>
+        <p:txBody>
+          <a:bodyPr/>
+          <a:lstStyle/>
+          <a:p>
+            <a:r>
+              <a:rPr lang="pt-BR"/>
+              <a:t>Título da apresentação</a:t>
+            </a:r>
+            <a:endParaRPr lang="pt-BR" dirty="0"/>
+          </a:p>
+        </p:txBody>
+      </p:sp>
+      <p:sp>
+        <p:nvSpPr>
+          <p:cNvPr id="6" name="Slide Number Placeholder 5">
+            <a:extLst>
+              <a:ext uri="{FF2B5EF4-FFF2-40B4-BE49-F238E27FC236}">
+                <a16:creationId xmlns:a16="http://schemas.microsoft.com/office/drawing/2014/main" id="{26F4D796-AF50-49B2-A75A-AE182D8637CC}"/>
+              </a:ext>
+            </a:extLst>
+          </p:cNvPr>
+          <p:cNvSpPr>
+            <a:spLocks noGrp="1"/>
+          </p:cNvSpPr>
+          <p:nvPr>
+            <p:ph type="sldNum" sz="quarter" idx="12"/>
+          </p:nvPr>
+        </p:nvSpPr>
+        <p:spPr>
+          <a:xfrm>
+            <a:off x="8801100" y="6350138"/>
+            <a:ext cx="2743200" cy="365125"/>
+          </a:xfrm>
+        </p:spPr>
+        <p:txBody>
+          <a:bodyPr/>
+          <a:lstStyle/>
+          <a:p>
+            <a:fld id="{943EB55C-D1D3-4EA7-96FF-7B21F10BDCBD}" type="slidenum">
+              <a:rPr lang="pt-BR" smtClean="0"/>
+              <a:pPr/>
+              <a:t>9</a:t>
+            </a:fld>
+            <a:endParaRPr lang="pt-BR" dirty="0"/>
+          </a:p>
+        </p:txBody>
+      </p:sp>
+    </p:spTree>
+    <p:extLst>
+      <p:ext uri="{BB962C8B-B14F-4D97-AF65-F5344CB8AC3E}">
+        <p14:creationId xmlns:p14="http://schemas.microsoft.com/office/powerpoint/2010/main" val="3193338241"/>
       </p:ext>
     </p:extLst>
   </p:cSld>

</xml_diff>

<commit_message>
finalização da introdução da apresentação
</commit_message>
<xml_diff>
--- a/apresentacao-final.pptx
+++ b/apresentacao-final.pptx
@@ -5,42 +5,44 @@
     <p:sldMasterId id="2147483648" r:id="rId1"/>
   </p:sldMasterIdLst>
   <p:notesMasterIdLst>
-    <p:notesMasterId r:id="rId18"/>
+    <p:notesMasterId r:id="rId20"/>
   </p:notesMasterIdLst>
   <p:sldIdLst>
     <p:sldId id="256" r:id="rId2"/>
     <p:sldId id="474" r:id="rId3"/>
     <p:sldId id="477" r:id="rId4"/>
     <p:sldId id="478" r:id="rId5"/>
-    <p:sldId id="479" r:id="rId6"/>
-    <p:sldId id="480" r:id="rId7"/>
-    <p:sldId id="481" r:id="rId8"/>
-    <p:sldId id="482" r:id="rId9"/>
-    <p:sldId id="487" r:id="rId10"/>
-    <p:sldId id="488" r:id="rId11"/>
-    <p:sldId id="483" r:id="rId12"/>
-    <p:sldId id="484" r:id="rId13"/>
-    <p:sldId id="485" r:id="rId14"/>
-    <p:sldId id="486" r:id="rId15"/>
-    <p:sldId id="471" r:id="rId16"/>
-    <p:sldId id="473" r:id="rId17"/>
+    <p:sldId id="489" r:id="rId6"/>
+    <p:sldId id="490" r:id="rId7"/>
+    <p:sldId id="479" r:id="rId8"/>
+    <p:sldId id="480" r:id="rId9"/>
+    <p:sldId id="481" r:id="rId10"/>
+    <p:sldId id="482" r:id="rId11"/>
+    <p:sldId id="487" r:id="rId12"/>
+    <p:sldId id="488" r:id="rId13"/>
+    <p:sldId id="483" r:id="rId14"/>
+    <p:sldId id="484" r:id="rId15"/>
+    <p:sldId id="485" r:id="rId16"/>
+    <p:sldId id="486" r:id="rId17"/>
+    <p:sldId id="471" r:id="rId18"/>
+    <p:sldId id="473" r:id="rId19"/>
   </p:sldIdLst>
   <p:sldSz cx="12192000" cy="6858000"/>
   <p:notesSz cx="6858000" cy="9144000"/>
   <p:embeddedFontLst>
     <p:embeddedFont>
       <p:font typeface="Calibri" panose="020F0502020204030204" pitchFamily="34" charset="0"/>
-      <p:regular r:id="rId19"/>
-      <p:bold r:id="rId20"/>
-      <p:italic r:id="rId21"/>
-      <p:boldItalic r:id="rId22"/>
+      <p:regular r:id="rId21"/>
+      <p:bold r:id="rId22"/>
+      <p:italic r:id="rId23"/>
+      <p:boldItalic r:id="rId24"/>
     </p:embeddedFont>
     <p:embeddedFont>
       <p:font typeface="Fira Sans" panose="020B0503050000020004" pitchFamily="34" charset="0"/>
-      <p:regular r:id="rId23"/>
-      <p:bold r:id="rId24"/>
-      <p:italic r:id="rId25"/>
-      <p:boldItalic r:id="rId26"/>
+      <p:regular r:id="rId25"/>
+      <p:bold r:id="rId26"/>
+      <p:italic r:id="rId27"/>
+      <p:boldItalic r:id="rId28"/>
     </p:embeddedFont>
   </p:embeddedFontLst>
   <p:defaultTextStyle>
@@ -151,6 +153,8 @@
           <p14:sldIdLst>
             <p14:sldId id="477"/>
             <p14:sldId id="478"/>
+            <p14:sldId id="489"/>
+            <p14:sldId id="490"/>
           </p14:sldIdLst>
         </p14:section>
         <p14:section name="AlexNet e ResNet" id="{97A7D4A1-415E-4C6D-A35D-4440082D8F35}">
@@ -5147,7 +5151,7 @@
           <a:p>
             <a:r>
               <a:rPr lang="pt-BR" dirty="0"/>
-              <a:t>Resultados</a:t>
+              <a:t>Experimentos</a:t>
             </a:r>
           </a:p>
         </p:txBody>
@@ -5258,7 +5262,7 @@
     </p:spTree>
     <p:extLst>
       <p:ext uri="{BB962C8B-B14F-4D97-AF65-F5344CB8AC3E}">
-        <p14:creationId xmlns:p14="http://schemas.microsoft.com/office/powerpoint/2010/main" val="1731404137"/>
+        <p14:creationId xmlns:p14="http://schemas.microsoft.com/office/powerpoint/2010/main" val="3156822045"/>
       </p:ext>
     </p:extLst>
   </p:cSld>
@@ -5313,12 +5317,8 @@
           <a:p>
             <a:r>
               <a:rPr lang="pt-BR" dirty="0"/>
-              <a:t>Discussão e considerações</a:t>
-            </a:r>
-            <a:br>
-              <a:rPr lang="pt-BR" dirty="0"/>
-            </a:br>
-            <a:endParaRPr lang="pt-BR" dirty="0"/>
+              <a:t>Resultados</a:t>
+            </a:r>
           </a:p>
         </p:txBody>
       </p:sp>
@@ -5453,7 +5453,7 @@
     </p:spTree>
     <p:extLst>
       <p:ext uri="{BB962C8B-B14F-4D97-AF65-F5344CB8AC3E}">
-        <p14:creationId xmlns:p14="http://schemas.microsoft.com/office/powerpoint/2010/main" val="1907464498"/>
+        <p14:creationId xmlns:p14="http://schemas.microsoft.com/office/powerpoint/2010/main" val="3193338241"/>
       </p:ext>
     </p:extLst>
   </p:cSld>
@@ -5533,7 +5533,7 @@
           <a:p>
             <a:r>
               <a:rPr lang="pt-BR" dirty="0"/>
-              <a:t>Discussão e considerações</a:t>
+              <a:t>Resultados</a:t>
             </a:r>
           </a:p>
         </p:txBody>
@@ -5644,7 +5644,7 @@
     </p:spTree>
     <p:extLst>
       <p:ext uri="{BB962C8B-B14F-4D97-AF65-F5344CB8AC3E}">
-        <p14:creationId xmlns:p14="http://schemas.microsoft.com/office/powerpoint/2010/main" val="833673590"/>
+        <p14:creationId xmlns:p14="http://schemas.microsoft.com/office/powerpoint/2010/main" val="1731404137"/>
       </p:ext>
     </p:extLst>
   </p:cSld>
@@ -5699,8 +5699,12 @@
           <a:p>
             <a:r>
               <a:rPr lang="pt-BR" dirty="0"/>
-              <a:t>Conclusão</a:t>
-            </a:r>
+              <a:t>Discussão e considerações</a:t>
+            </a:r>
+            <a:br>
+              <a:rPr lang="pt-BR" dirty="0"/>
+            </a:br>
+            <a:endParaRPr lang="pt-BR" dirty="0"/>
           </a:p>
         </p:txBody>
       </p:sp>
@@ -5835,7 +5839,7 @@
     </p:spTree>
     <p:extLst>
       <p:ext uri="{BB962C8B-B14F-4D97-AF65-F5344CB8AC3E}">
-        <p14:creationId xmlns:p14="http://schemas.microsoft.com/office/powerpoint/2010/main" val="1960573890"/>
+        <p14:creationId xmlns:p14="http://schemas.microsoft.com/office/powerpoint/2010/main" val="1907464498"/>
       </p:ext>
     </p:extLst>
   </p:cSld>
@@ -5915,7 +5919,7 @@
           <a:p>
             <a:r>
               <a:rPr lang="pt-BR" dirty="0"/>
-              <a:t>Conclusão</a:t>
+              <a:t>Discussão e considerações</a:t>
             </a:r>
           </a:p>
         </p:txBody>
@@ -6026,7 +6030,7 @@
     </p:spTree>
     <p:extLst>
       <p:ext uri="{BB962C8B-B14F-4D97-AF65-F5344CB8AC3E}">
-        <p14:creationId xmlns:p14="http://schemas.microsoft.com/office/powerpoint/2010/main" val="2371622552"/>
+        <p14:creationId xmlns:p14="http://schemas.microsoft.com/office/powerpoint/2010/main" val="833673590"/>
       </p:ext>
     </p:extLst>
   </p:cSld>
@@ -6055,18 +6059,51 @@
       </p:grpSpPr>
       <p:sp>
         <p:nvSpPr>
-          <p:cNvPr id="2" name="Title 1">
-            <a:extLst>
-              <a:ext uri="{FF2B5EF4-FFF2-40B4-BE49-F238E27FC236}">
-                <a16:creationId xmlns:a16="http://schemas.microsoft.com/office/drawing/2014/main" id="{E4440357-E8E4-4C41-A8A0-7FD4B3E5BF09}"/>
-              </a:ext>
-            </a:extLst>
-          </p:cNvPr>
-          <p:cNvSpPr>
-            <a:spLocks noGrp="1"/>
-          </p:cNvSpPr>
-          <p:nvPr>
-            <p:ph type="ctrTitle"/>
+          <p:cNvPr id="7" name="Title 6">
+            <a:extLst>
+              <a:ext uri="{FF2B5EF4-FFF2-40B4-BE49-F238E27FC236}">
+                <a16:creationId xmlns:a16="http://schemas.microsoft.com/office/drawing/2014/main" id="{9CC6423C-8458-46DA-B904-ACDE246A1D10}"/>
+              </a:ext>
+            </a:extLst>
+          </p:cNvPr>
+          <p:cNvSpPr>
+            <a:spLocks noGrp="1"/>
+          </p:cNvSpPr>
+          <p:nvPr>
+            <p:ph type="title"/>
+          </p:nvPr>
+        </p:nvSpPr>
+        <p:spPr>
+          <a:xfrm>
+            <a:off x="831850" y="1709738"/>
+            <a:ext cx="10515600" cy="2852737"/>
+          </a:xfrm>
+        </p:spPr>
+        <p:txBody>
+          <a:bodyPr/>
+          <a:lstStyle/>
+          <a:p>
+            <a:r>
+              <a:rPr lang="pt-BR" dirty="0"/>
+              <a:t>Conclusão</a:t>
+            </a:r>
+          </a:p>
+        </p:txBody>
+      </p:sp>
+      <p:sp>
+        <p:nvSpPr>
+          <p:cNvPr id="13" name="Text Placeholder 12">
+            <a:extLst>
+              <a:ext uri="{FF2B5EF4-FFF2-40B4-BE49-F238E27FC236}">
+                <a16:creationId xmlns:a16="http://schemas.microsoft.com/office/drawing/2014/main" id="{B30C2ED5-76F3-4F62-A6AA-A6FBD0AB33B6}"/>
+              </a:ext>
+            </a:extLst>
+          </p:cNvPr>
+          <p:cNvSpPr>
+            <a:spLocks noGrp="1"/>
+          </p:cNvSpPr>
+          <p:nvPr>
+            <p:ph type="body" idx="1"/>
           </p:nvPr>
         </p:nvSpPr>
         <p:spPr/>
@@ -6074,45 +6111,117 @@
           <a:bodyPr/>
           <a:lstStyle/>
           <a:p>
-            <a:r>
-              <a:rPr lang="pt-BR" dirty="0"/>
-              <a:t>FIM</a:t>
-            </a:r>
-          </a:p>
-        </p:txBody>
-      </p:sp>
-      <p:sp>
-        <p:nvSpPr>
-          <p:cNvPr id="7" name="Subtitle 6">
-            <a:extLst>
-              <a:ext uri="{FF2B5EF4-FFF2-40B4-BE49-F238E27FC236}">
-                <a16:creationId xmlns:a16="http://schemas.microsoft.com/office/drawing/2014/main" id="{685C172B-D2B8-4FBF-B950-491F48221CE4}"/>
-              </a:ext>
-            </a:extLst>
-          </p:cNvPr>
-          <p:cNvSpPr>
-            <a:spLocks noGrp="1"/>
-          </p:cNvSpPr>
-          <p:nvPr>
-            <p:ph type="subTitle" idx="1"/>
-          </p:nvPr>
-        </p:nvSpPr>
-        <p:spPr/>
-        <p:txBody>
-          <a:bodyPr/>
-          <a:lstStyle/>
-          <a:p>
-            <a:r>
-              <a:rPr lang="pt-BR" dirty="0"/>
-              <a:t>Obrigado pela sua atenção</a:t>
-            </a:r>
+            <a:endParaRPr lang="pt-BR"/>
+          </a:p>
+        </p:txBody>
+      </p:sp>
+      <p:sp>
+        <p:nvSpPr>
+          <p:cNvPr id="4" name="Date Placeholder 3">
+            <a:extLst>
+              <a:ext uri="{FF2B5EF4-FFF2-40B4-BE49-F238E27FC236}">
+                <a16:creationId xmlns:a16="http://schemas.microsoft.com/office/drawing/2014/main" id="{7C5D03F3-4FCC-4BAA-987F-D7F5F97D7EA1}"/>
+              </a:ext>
+            </a:extLst>
+          </p:cNvPr>
+          <p:cNvSpPr>
+            <a:spLocks noGrp="1"/>
+          </p:cNvSpPr>
+          <p:nvPr>
+            <p:ph type="dt" sz="half" idx="10"/>
+          </p:nvPr>
+        </p:nvSpPr>
+        <p:spPr>
+          <a:xfrm>
+            <a:off x="156557" y="6350138"/>
+            <a:ext cx="2743200" cy="365125"/>
+          </a:xfrm>
+        </p:spPr>
+        <p:txBody>
+          <a:bodyPr/>
+          <a:lstStyle/>
+          <a:p>
+            <a:r>
+              <a:rPr lang="pt-BR"/>
+              <a:t>Nome do Apresentador - email</a:t>
+            </a:r>
+            <a:endParaRPr lang="pt-BR" dirty="0"/>
+          </a:p>
+        </p:txBody>
+      </p:sp>
+      <p:sp>
+        <p:nvSpPr>
+          <p:cNvPr id="5" name="Footer Placeholder 4">
+            <a:extLst>
+              <a:ext uri="{FF2B5EF4-FFF2-40B4-BE49-F238E27FC236}">
+                <a16:creationId xmlns:a16="http://schemas.microsoft.com/office/drawing/2014/main" id="{6D958900-CEE3-43FE-A1A6-0F5416100DBF}"/>
+              </a:ext>
+            </a:extLst>
+          </p:cNvPr>
+          <p:cNvSpPr>
+            <a:spLocks noGrp="1"/>
+          </p:cNvSpPr>
+          <p:nvPr>
+            <p:ph type="ftr" sz="quarter" idx="11"/>
+          </p:nvPr>
+        </p:nvSpPr>
+        <p:spPr>
+          <a:xfrm>
+            <a:off x="4038600" y="6356350"/>
+            <a:ext cx="4114800" cy="365125"/>
+          </a:xfrm>
+        </p:spPr>
+        <p:txBody>
+          <a:bodyPr/>
+          <a:lstStyle/>
+          <a:p>
+            <a:r>
+              <a:rPr lang="pt-BR"/>
+              <a:t>Título da apresentação</a:t>
+            </a:r>
+            <a:endParaRPr lang="pt-BR" dirty="0"/>
+          </a:p>
+        </p:txBody>
+      </p:sp>
+      <p:sp>
+        <p:nvSpPr>
+          <p:cNvPr id="6" name="Slide Number Placeholder 5">
+            <a:extLst>
+              <a:ext uri="{FF2B5EF4-FFF2-40B4-BE49-F238E27FC236}">
+                <a16:creationId xmlns:a16="http://schemas.microsoft.com/office/drawing/2014/main" id="{26F4D796-AF50-49B2-A75A-AE182D8637CC}"/>
+              </a:ext>
+            </a:extLst>
+          </p:cNvPr>
+          <p:cNvSpPr>
+            <a:spLocks noGrp="1"/>
+          </p:cNvSpPr>
+          <p:nvPr>
+            <p:ph type="sldNum" sz="quarter" idx="12"/>
+          </p:nvPr>
+        </p:nvSpPr>
+        <p:spPr>
+          <a:xfrm>
+            <a:off x="8801100" y="6350138"/>
+            <a:ext cx="2743200" cy="365125"/>
+          </a:xfrm>
+        </p:spPr>
+        <p:txBody>
+          <a:bodyPr/>
+          <a:lstStyle/>
+          <a:p>
+            <a:fld id="{943EB55C-D1D3-4EA7-96FF-7B21F10BDCBD}" type="slidenum">
+              <a:rPr lang="pt-BR" smtClean="0"/>
+              <a:pPr/>
+              <a:t>15</a:t>
+            </a:fld>
+            <a:endParaRPr lang="pt-BR" dirty="0"/>
           </a:p>
         </p:txBody>
       </p:sp>
     </p:spTree>
     <p:extLst>
       <p:ext uri="{BB962C8B-B14F-4D97-AF65-F5344CB8AC3E}">
-        <p14:creationId xmlns:p14="http://schemas.microsoft.com/office/powerpoint/2010/main" val="1168007158"/>
+        <p14:creationId xmlns:p14="http://schemas.microsoft.com/office/powerpoint/2010/main" val="1960573890"/>
       </p:ext>
     </p:extLst>
   </p:cSld>
@@ -6141,6 +6250,283 @@
       </p:grpSpPr>
       <p:sp>
         <p:nvSpPr>
+          <p:cNvPr id="13" name="Content Placeholder 12">
+            <a:extLst>
+              <a:ext uri="{FF2B5EF4-FFF2-40B4-BE49-F238E27FC236}">
+                <a16:creationId xmlns:a16="http://schemas.microsoft.com/office/drawing/2014/main" id="{B6B46987-6570-415B-8F92-54BD5CC6781C}"/>
+              </a:ext>
+            </a:extLst>
+          </p:cNvPr>
+          <p:cNvSpPr>
+            <a:spLocks noGrp="1"/>
+          </p:cNvSpPr>
+          <p:nvPr>
+            <p:ph idx="1"/>
+          </p:nvPr>
+        </p:nvSpPr>
+        <p:spPr/>
+        <p:txBody>
+          <a:bodyPr/>
+          <a:lstStyle/>
+          <a:p>
+            <a:endParaRPr lang="pt-BR"/>
+          </a:p>
+        </p:txBody>
+      </p:sp>
+      <p:sp>
+        <p:nvSpPr>
+          <p:cNvPr id="7" name="Title 6">
+            <a:extLst>
+              <a:ext uri="{FF2B5EF4-FFF2-40B4-BE49-F238E27FC236}">
+                <a16:creationId xmlns:a16="http://schemas.microsoft.com/office/drawing/2014/main" id="{CEFC600F-5C28-49BA-96C4-7E0B3DEE9C26}"/>
+              </a:ext>
+            </a:extLst>
+          </p:cNvPr>
+          <p:cNvSpPr>
+            <a:spLocks noGrp="1"/>
+          </p:cNvSpPr>
+          <p:nvPr>
+            <p:ph type="title"/>
+          </p:nvPr>
+        </p:nvSpPr>
+        <p:spPr>
+          <a:xfrm>
+            <a:off x="1155469" y="66183"/>
+            <a:ext cx="10914610" cy="1334336"/>
+          </a:xfrm>
+        </p:spPr>
+        <p:txBody>
+          <a:bodyPr/>
+          <a:lstStyle/>
+          <a:p>
+            <a:r>
+              <a:rPr lang="pt-BR" dirty="0"/>
+              <a:t>Conclusão</a:t>
+            </a:r>
+          </a:p>
+        </p:txBody>
+      </p:sp>
+      <p:sp>
+        <p:nvSpPr>
+          <p:cNvPr id="4" name="Date Placeholder 3">
+            <a:extLst>
+              <a:ext uri="{FF2B5EF4-FFF2-40B4-BE49-F238E27FC236}">
+                <a16:creationId xmlns:a16="http://schemas.microsoft.com/office/drawing/2014/main" id="{66EAB9D3-2A09-491C-8833-02AB09A1EE2D}"/>
+              </a:ext>
+            </a:extLst>
+          </p:cNvPr>
+          <p:cNvSpPr>
+            <a:spLocks noGrp="1"/>
+          </p:cNvSpPr>
+          <p:nvPr>
+            <p:ph type="dt" sz="half" idx="10"/>
+          </p:nvPr>
+        </p:nvSpPr>
+        <p:spPr>
+          <a:xfrm>
+            <a:off x="156557" y="6350138"/>
+            <a:ext cx="2743200" cy="365125"/>
+          </a:xfrm>
+        </p:spPr>
+        <p:txBody>
+          <a:bodyPr/>
+          <a:lstStyle/>
+          <a:p>
+            <a:r>
+              <a:rPr lang="pt-BR"/>
+              <a:t>Nome do Apresentador - email</a:t>
+            </a:r>
+            <a:endParaRPr lang="pt-BR" dirty="0"/>
+          </a:p>
+        </p:txBody>
+      </p:sp>
+      <p:sp>
+        <p:nvSpPr>
+          <p:cNvPr id="5" name="Footer Placeholder 4">
+            <a:extLst>
+              <a:ext uri="{FF2B5EF4-FFF2-40B4-BE49-F238E27FC236}">
+                <a16:creationId xmlns:a16="http://schemas.microsoft.com/office/drawing/2014/main" id="{8AA0FFBD-7651-4269-9653-4098295EE79C}"/>
+              </a:ext>
+            </a:extLst>
+          </p:cNvPr>
+          <p:cNvSpPr>
+            <a:spLocks noGrp="1"/>
+          </p:cNvSpPr>
+          <p:nvPr>
+            <p:ph type="ftr" sz="quarter" idx="11"/>
+          </p:nvPr>
+        </p:nvSpPr>
+        <p:spPr>
+          <a:xfrm>
+            <a:off x="4038600" y="6356350"/>
+            <a:ext cx="4114800" cy="365125"/>
+          </a:xfrm>
+        </p:spPr>
+        <p:txBody>
+          <a:bodyPr/>
+          <a:lstStyle/>
+          <a:p>
+            <a:r>
+              <a:rPr lang="pt-BR"/>
+              <a:t>Título da apresentação</a:t>
+            </a:r>
+            <a:endParaRPr lang="pt-BR" dirty="0"/>
+          </a:p>
+        </p:txBody>
+      </p:sp>
+      <p:sp>
+        <p:nvSpPr>
+          <p:cNvPr id="6" name="Slide Number Placeholder 5">
+            <a:extLst>
+              <a:ext uri="{FF2B5EF4-FFF2-40B4-BE49-F238E27FC236}">
+                <a16:creationId xmlns:a16="http://schemas.microsoft.com/office/drawing/2014/main" id="{5A9C589F-A23D-4FE6-8623-E197ED8DA27C}"/>
+              </a:ext>
+            </a:extLst>
+          </p:cNvPr>
+          <p:cNvSpPr>
+            <a:spLocks noGrp="1"/>
+          </p:cNvSpPr>
+          <p:nvPr>
+            <p:ph type="sldNum" sz="quarter" idx="12"/>
+          </p:nvPr>
+        </p:nvSpPr>
+        <p:spPr>
+          <a:xfrm>
+            <a:off x="8801100" y="6350138"/>
+            <a:ext cx="2743200" cy="365125"/>
+          </a:xfrm>
+        </p:spPr>
+        <p:txBody>
+          <a:bodyPr/>
+          <a:lstStyle/>
+          <a:p>
+            <a:fld id="{943EB55C-D1D3-4EA7-96FF-7B21F10BDCBD}" type="slidenum">
+              <a:rPr lang="pt-BR" smtClean="0"/>
+              <a:pPr/>
+              <a:t>16</a:t>
+            </a:fld>
+            <a:endParaRPr lang="pt-BR" dirty="0"/>
+          </a:p>
+        </p:txBody>
+      </p:sp>
+    </p:spTree>
+    <p:extLst>
+      <p:ext uri="{BB962C8B-B14F-4D97-AF65-F5344CB8AC3E}">
+        <p14:creationId xmlns:p14="http://schemas.microsoft.com/office/powerpoint/2010/main" val="2371622552"/>
+      </p:ext>
+    </p:extLst>
+  </p:cSld>
+  <p:clrMapOvr>
+    <a:masterClrMapping/>
+  </p:clrMapOvr>
+</p:sld>
+</file>
+
+<file path=ppt/slides/slide17.xml><?xml version="1.0" encoding="utf-8"?>
+<p:sld xmlns:a="http://schemas.openxmlformats.org/drawingml/2006/main" xmlns:r="http://schemas.openxmlformats.org/officeDocument/2006/relationships" xmlns:p="http://schemas.openxmlformats.org/presentationml/2006/main">
+  <p:cSld>
+    <p:spTree>
+      <p:nvGrpSpPr>
+        <p:cNvPr id="1" name=""/>
+        <p:cNvGrpSpPr/>
+        <p:nvPr/>
+      </p:nvGrpSpPr>
+      <p:grpSpPr>
+        <a:xfrm>
+          <a:off x="0" y="0"/>
+          <a:ext cx="0" cy="0"/>
+          <a:chOff x="0" y="0"/>
+          <a:chExt cx="0" cy="0"/>
+        </a:xfrm>
+      </p:grpSpPr>
+      <p:sp>
+        <p:nvSpPr>
+          <p:cNvPr id="2" name="Title 1">
+            <a:extLst>
+              <a:ext uri="{FF2B5EF4-FFF2-40B4-BE49-F238E27FC236}">
+                <a16:creationId xmlns:a16="http://schemas.microsoft.com/office/drawing/2014/main" id="{E4440357-E8E4-4C41-A8A0-7FD4B3E5BF09}"/>
+              </a:ext>
+            </a:extLst>
+          </p:cNvPr>
+          <p:cNvSpPr>
+            <a:spLocks noGrp="1"/>
+          </p:cNvSpPr>
+          <p:nvPr>
+            <p:ph type="ctrTitle"/>
+          </p:nvPr>
+        </p:nvSpPr>
+        <p:spPr/>
+        <p:txBody>
+          <a:bodyPr/>
+          <a:lstStyle/>
+          <a:p>
+            <a:r>
+              <a:rPr lang="pt-BR" dirty="0"/>
+              <a:t>FIM</a:t>
+            </a:r>
+          </a:p>
+        </p:txBody>
+      </p:sp>
+      <p:sp>
+        <p:nvSpPr>
+          <p:cNvPr id="7" name="Subtitle 6">
+            <a:extLst>
+              <a:ext uri="{FF2B5EF4-FFF2-40B4-BE49-F238E27FC236}">
+                <a16:creationId xmlns:a16="http://schemas.microsoft.com/office/drawing/2014/main" id="{685C172B-D2B8-4FBF-B950-491F48221CE4}"/>
+              </a:ext>
+            </a:extLst>
+          </p:cNvPr>
+          <p:cNvSpPr>
+            <a:spLocks noGrp="1"/>
+          </p:cNvSpPr>
+          <p:nvPr>
+            <p:ph type="subTitle" idx="1"/>
+          </p:nvPr>
+        </p:nvSpPr>
+        <p:spPr/>
+        <p:txBody>
+          <a:bodyPr/>
+          <a:lstStyle/>
+          <a:p>
+            <a:r>
+              <a:rPr lang="pt-BR" dirty="0"/>
+              <a:t>Obrigado pela sua atenção</a:t>
+            </a:r>
+          </a:p>
+        </p:txBody>
+      </p:sp>
+    </p:spTree>
+    <p:extLst>
+      <p:ext uri="{BB962C8B-B14F-4D97-AF65-F5344CB8AC3E}">
+        <p14:creationId xmlns:p14="http://schemas.microsoft.com/office/powerpoint/2010/main" val="1168007158"/>
+      </p:ext>
+    </p:extLst>
+  </p:cSld>
+  <p:clrMapOvr>
+    <a:masterClrMapping/>
+  </p:clrMapOvr>
+</p:sld>
+</file>
+
+<file path=ppt/slides/slide18.xml><?xml version="1.0" encoding="utf-8"?>
+<p:sld xmlns:a="http://schemas.openxmlformats.org/drawingml/2006/main" xmlns:r="http://schemas.openxmlformats.org/officeDocument/2006/relationships" xmlns:p="http://schemas.openxmlformats.org/presentationml/2006/main">
+  <p:cSld>
+    <p:spTree>
+      <p:nvGrpSpPr>
+        <p:cNvPr id="1" name=""/>
+        <p:cNvGrpSpPr/>
+        <p:nvPr/>
+      </p:nvGrpSpPr>
+      <p:grpSpPr>
+        <a:xfrm>
+          <a:off x="0" y="0"/>
+          <a:ext cx="0" cy="0"/>
+          <a:chOff x="0" y="0"/>
+          <a:chExt cx="0" cy="0"/>
+        </a:xfrm>
+      </p:grpSpPr>
+      <p:sp>
+        <p:nvSpPr>
           <p:cNvPr id="2" name="Content Placeholder 1">
             <a:extLst>
               <a:ext uri="{FF2B5EF4-FFF2-40B4-BE49-F238E27FC236}">
@@ -6277,7 +6663,7 @@
             <a:fld id="{943EB55C-D1D3-4EA7-96FF-7B21F10BDCBD}" type="slidenum">
               <a:rPr lang="pt-BR" smtClean="0"/>
               <a:pPr/>
-              <a:t>16</a:t>
+              <a:t>18</a:t>
             </a:fld>
             <a:endParaRPr lang="pt-BR" dirty="0"/>
           </a:p>
@@ -6775,7 +7161,53 @@
           <a:bodyPr/>
           <a:lstStyle/>
           <a:p>
-            <a:endParaRPr lang="pt-BR"/>
+            <a:r>
+              <a:rPr lang="pt-BR" dirty="0"/>
+              <a:t>Frequente aumento da conectividade e influência de algoritmos em nossas vidas.</a:t>
+            </a:r>
+          </a:p>
+          <a:p>
+            <a:r>
+              <a:rPr lang="pt-BR" dirty="0"/>
+              <a:t>Necessidade de aumentar a credibilidade e confiabilidade.</a:t>
+            </a:r>
+          </a:p>
+          <a:p>
+            <a:pPr lvl="1"/>
+            <a:r>
+              <a:rPr lang="pt-BR" b="1" dirty="0"/>
+              <a:t>Proveniência!</a:t>
+            </a:r>
+          </a:p>
+          <a:p>
+            <a:r>
+              <a:rPr lang="pt-BR" b="1" dirty="0" err="1"/>
+              <a:t>Keras-Prov</a:t>
+            </a:r>
+            <a:r>
+              <a:rPr lang="pt-BR" dirty="0"/>
+              <a:t> como serviço de proveniência para Redes Neurais Profundas (RNN ou DNN, </a:t>
+            </a:r>
+            <a:r>
+              <a:rPr lang="pt-BR" i="1" dirty="0" err="1"/>
+              <a:t>deep</a:t>
+            </a:r>
+            <a:r>
+              <a:rPr lang="pt-BR" i="1" dirty="0"/>
+              <a:t> </a:t>
+            </a:r>
+            <a:r>
+              <a:rPr lang="pt-BR" i="1" dirty="0" err="1"/>
+              <a:t>learning</a:t>
+            </a:r>
+            <a:r>
+              <a:rPr lang="pt-BR" i="1" dirty="0"/>
+              <a:t> networks</a:t>
+            </a:r>
+            <a:r>
+              <a:rPr lang="pt-BR" dirty="0"/>
+              <a:t>).</a:t>
+            </a:r>
           </a:p>
         </p:txBody>
       </p:sp>
@@ -6945,12 +7377,47 @@
           <a:chExt cx="0" cy="0"/>
         </a:xfrm>
       </p:grpSpPr>
+      <p:pic>
+        <p:nvPicPr>
+          <p:cNvPr id="3" name="Espaço Reservado para Conteúdo 2">
+            <a:extLst>
+              <a:ext uri="{FF2B5EF4-FFF2-40B4-BE49-F238E27FC236}">
+                <a16:creationId xmlns:a16="http://schemas.microsoft.com/office/drawing/2014/main" id="{E9A3BB3F-A839-42EC-9006-E817E767E2F1}"/>
+              </a:ext>
+            </a:extLst>
+          </p:cNvPr>
+          <p:cNvPicPr>
+            <a:picLocks noGrp="1" noChangeAspect="1"/>
+          </p:cNvPicPr>
+          <p:nvPr>
+            <p:ph idx="1"/>
+          </p:nvPr>
+        </p:nvPicPr>
+        <p:blipFill>
+          <a:blip r:embed="rId2">
+            <a:extLst>
+              <a:ext uri="{28A0092B-C50C-407E-A947-70E740481C1C}">
+                <a14:useLocalDpi xmlns:a14="http://schemas.microsoft.com/office/drawing/2010/main" val="0"/>
+              </a:ext>
+            </a:extLst>
+          </a:blip>
+          <a:stretch>
+            <a:fillRect/>
+          </a:stretch>
+        </p:blipFill>
+        <p:spPr>
+          <a:xfrm>
+            <a:off x="3004946" y="1400519"/>
+            <a:ext cx="6182107" cy="4169183"/>
+          </a:xfrm>
+        </p:spPr>
+      </p:pic>
       <p:sp>
         <p:nvSpPr>
           <p:cNvPr id="7" name="Title 6">
             <a:extLst>
               <a:ext uri="{FF2B5EF4-FFF2-40B4-BE49-F238E27FC236}">
-                <a16:creationId xmlns:a16="http://schemas.microsoft.com/office/drawing/2014/main" id="{9CC6423C-8458-46DA-B904-ACDE246A1D10}"/>
+                <a16:creationId xmlns:a16="http://schemas.microsoft.com/office/drawing/2014/main" id="{CEFC600F-5C28-49BA-96C4-7E0B3DEE9C26}"/>
               </a:ext>
             </a:extLst>
           </p:cNvPr>
@@ -6963,52 +7430,18 @@
         </p:nvSpPr>
         <p:spPr>
           <a:xfrm>
-            <a:off x="831850" y="1709738"/>
-            <a:ext cx="10515600" cy="2852737"/>
-          </a:xfrm>
-        </p:spPr>
-        <p:txBody>
-          <a:bodyPr/>
-          <a:lstStyle/>
-          <a:p>
-            <a:r>
-              <a:rPr lang="pt-BR" dirty="0" err="1"/>
-              <a:t>AlexNet</a:t>
-            </a:r>
+            <a:off x="1155469" y="66183"/>
+            <a:ext cx="10914610" cy="1334336"/>
+          </a:xfrm>
+        </p:spPr>
+        <p:txBody>
+          <a:bodyPr/>
+          <a:lstStyle/>
+          <a:p>
             <a:r>
               <a:rPr lang="pt-BR" dirty="0"/>
-              <a:t> e </a:t>
-            </a:r>
-            <a:r>
-              <a:rPr lang="pt-BR" dirty="0" err="1"/>
-              <a:t>ResNet</a:t>
-            </a:r>
-            <a:endParaRPr lang="pt-BR" dirty="0"/>
-          </a:p>
-        </p:txBody>
-      </p:sp>
-      <p:sp>
-        <p:nvSpPr>
-          <p:cNvPr id="13" name="Text Placeholder 12">
-            <a:extLst>
-              <a:ext uri="{FF2B5EF4-FFF2-40B4-BE49-F238E27FC236}">
-                <a16:creationId xmlns:a16="http://schemas.microsoft.com/office/drawing/2014/main" id="{B30C2ED5-76F3-4F62-A6AA-A6FBD0AB33B6}"/>
-              </a:ext>
-            </a:extLst>
-          </p:cNvPr>
-          <p:cNvSpPr>
-            <a:spLocks noGrp="1"/>
-          </p:cNvSpPr>
-          <p:nvPr>
-            <p:ph type="body" idx="1"/>
-          </p:nvPr>
-        </p:nvSpPr>
-        <p:spPr/>
-        <p:txBody>
-          <a:bodyPr/>
-          <a:lstStyle/>
-          <a:p>
-            <a:endParaRPr lang="pt-BR"/>
+              <a:t>Introdução</a:t>
+            </a:r>
           </a:p>
         </p:txBody>
       </p:sp>
@@ -7017,7 +7450,7 @@
           <p:cNvPr id="4" name="Date Placeholder 3">
             <a:extLst>
               <a:ext uri="{FF2B5EF4-FFF2-40B4-BE49-F238E27FC236}">
-                <a16:creationId xmlns:a16="http://schemas.microsoft.com/office/drawing/2014/main" id="{7C5D03F3-4FCC-4BAA-987F-D7F5F97D7EA1}"/>
+                <a16:creationId xmlns:a16="http://schemas.microsoft.com/office/drawing/2014/main" id="{66EAB9D3-2A09-491C-8833-02AB09A1EE2D}"/>
               </a:ext>
             </a:extLst>
           </p:cNvPr>
@@ -7051,7 +7484,7 @@
           <p:cNvPr id="5" name="Footer Placeholder 4">
             <a:extLst>
               <a:ext uri="{FF2B5EF4-FFF2-40B4-BE49-F238E27FC236}">
-                <a16:creationId xmlns:a16="http://schemas.microsoft.com/office/drawing/2014/main" id="{6D958900-CEE3-43FE-A1A6-0F5416100DBF}"/>
+                <a16:creationId xmlns:a16="http://schemas.microsoft.com/office/drawing/2014/main" id="{8AA0FFBD-7651-4269-9653-4098295EE79C}"/>
               </a:ext>
             </a:extLst>
           </p:cNvPr>
@@ -7085,7 +7518,7 @@
           <p:cNvPr id="6" name="Slide Number Placeholder 5">
             <a:extLst>
               <a:ext uri="{FF2B5EF4-FFF2-40B4-BE49-F238E27FC236}">
-                <a16:creationId xmlns:a16="http://schemas.microsoft.com/office/drawing/2014/main" id="{26F4D796-AF50-49B2-A75A-AE182D8637CC}"/>
+                <a16:creationId xmlns:a16="http://schemas.microsoft.com/office/drawing/2014/main" id="{5A9C589F-A23D-4FE6-8623-E197ED8DA27C}"/>
               </a:ext>
             </a:extLst>
           </p:cNvPr>
@@ -7118,7 +7551,7 @@
     </p:spTree>
     <p:extLst>
       <p:ext uri="{BB962C8B-B14F-4D97-AF65-F5344CB8AC3E}">
-        <p14:creationId xmlns:p14="http://schemas.microsoft.com/office/powerpoint/2010/main" val="2707637187"/>
+        <p14:creationId xmlns:p14="http://schemas.microsoft.com/office/powerpoint/2010/main" val="3190355201"/>
       </p:ext>
     </p:extLst>
   </p:cSld>
@@ -7147,31 +7580,6 @@
       </p:grpSpPr>
       <p:sp>
         <p:nvSpPr>
-          <p:cNvPr id="13" name="Content Placeholder 12">
-            <a:extLst>
-              <a:ext uri="{FF2B5EF4-FFF2-40B4-BE49-F238E27FC236}">
-                <a16:creationId xmlns:a16="http://schemas.microsoft.com/office/drawing/2014/main" id="{B6B46987-6570-415B-8F92-54BD5CC6781C}"/>
-              </a:ext>
-            </a:extLst>
-          </p:cNvPr>
-          <p:cNvSpPr>
-            <a:spLocks noGrp="1"/>
-          </p:cNvSpPr>
-          <p:nvPr>
-            <p:ph idx="1"/>
-          </p:nvPr>
-        </p:nvSpPr>
-        <p:spPr/>
-        <p:txBody>
-          <a:bodyPr/>
-          <a:lstStyle/>
-          <a:p>
-            <a:endParaRPr lang="pt-BR"/>
-          </a:p>
-        </p:txBody>
-      </p:sp>
-      <p:sp>
-        <p:nvSpPr>
           <p:cNvPr id="7" name="Title 6">
             <a:extLst>
               <a:ext uri="{FF2B5EF4-FFF2-40B4-BE49-F238E27FC236}">
@@ -7197,18 +7605,9 @@
           <a:lstStyle/>
           <a:p>
             <a:r>
-              <a:rPr lang="pt-BR" dirty="0" err="1"/>
-              <a:t>AlexNet</a:t>
-            </a:r>
-            <a:r>
               <a:rPr lang="pt-BR" dirty="0"/>
-              <a:t> e </a:t>
-            </a:r>
-            <a:r>
-              <a:rPr lang="pt-BR" dirty="0" err="1"/>
-              <a:t>ResNet</a:t>
-            </a:r>
-            <a:endParaRPr lang="pt-BR" dirty="0"/>
+              <a:t>Introdução</a:t>
+            </a:r>
           </a:p>
         </p:txBody>
       </p:sp>
@@ -7315,10 +7714,91 @@
           </a:p>
         </p:txBody>
       </p:sp>
+      <p:sp>
+        <p:nvSpPr>
+          <p:cNvPr id="8" name="Espaço Reservado para Conteúdo 7">
+            <a:extLst>
+              <a:ext uri="{FF2B5EF4-FFF2-40B4-BE49-F238E27FC236}">
+                <a16:creationId xmlns:a16="http://schemas.microsoft.com/office/drawing/2014/main" id="{3A0DCE3F-284F-47C3-BCF2-B3A42DA4C2BF}"/>
+              </a:ext>
+            </a:extLst>
+          </p:cNvPr>
+          <p:cNvSpPr>
+            <a:spLocks noGrp="1"/>
+          </p:cNvSpPr>
+          <p:nvPr>
+            <p:ph idx="1"/>
+          </p:nvPr>
+        </p:nvSpPr>
+        <p:spPr/>
+        <p:txBody>
+          <a:bodyPr>
+            <a:normAutofit/>
+          </a:bodyPr>
+          <a:lstStyle/>
+          <a:p>
+            <a:pPr marL="0" indent="0" algn="ctr">
+              <a:buNone/>
+            </a:pPr>
+            <a:r>
+              <a:rPr lang="pt-BR" sz="4400" b="1" dirty="0"/>
+              <a:t>OBJETIVO: </a:t>
+            </a:r>
+            <a:r>
+              <a:rPr lang="pt-BR" sz="4400" dirty="0"/>
+              <a:t>utilização do </a:t>
+            </a:r>
+            <a:r>
+              <a:rPr lang="pt-BR" sz="4400" b="1" dirty="0" err="1"/>
+              <a:t>Keras-Prov</a:t>
+            </a:r>
+            <a:r>
+              <a:rPr lang="pt-BR" sz="4400" dirty="0"/>
+              <a:t> para </a:t>
+            </a:r>
+            <a:r>
+              <a:rPr lang="pt-BR" sz="4400" b="1" dirty="0"/>
+              <a:t>comparar</a:t>
+            </a:r>
+            <a:r>
+              <a:rPr lang="pt-BR" sz="4400" dirty="0"/>
+              <a:t> as redes </a:t>
+            </a:r>
+            <a:r>
+              <a:rPr lang="pt-BR" sz="4400" b="1" dirty="0" err="1"/>
+              <a:t>AlexNet</a:t>
+            </a:r>
+            <a:r>
+              <a:rPr lang="pt-BR" sz="4400" b="1" dirty="0"/>
+              <a:t> e </a:t>
+            </a:r>
+            <a:r>
+              <a:rPr lang="pt-BR" sz="4400" b="1" dirty="0" err="1"/>
+              <a:t>ResNet</a:t>
+            </a:r>
+            <a:r>
+              <a:rPr lang="pt-BR" sz="4400" b="1" dirty="0"/>
+              <a:t> </a:t>
+            </a:r>
+            <a:r>
+              <a:rPr lang="pt-BR" sz="4400" dirty="0"/>
+              <a:t>em quesitos como </a:t>
+            </a:r>
+            <a:r>
+              <a:rPr lang="pt-BR" sz="4400" b="1" dirty="0"/>
+              <a:t>eficácia e eficiência</a:t>
+            </a:r>
+            <a:r>
+              <a:rPr lang="pt-BR" sz="4400" dirty="0"/>
+              <a:t>.</a:t>
+            </a:r>
+          </a:p>
+        </p:txBody>
+      </p:sp>
     </p:spTree>
     <p:extLst>
       <p:ext uri="{BB962C8B-B14F-4D97-AF65-F5344CB8AC3E}">
-        <p14:creationId xmlns:p14="http://schemas.microsoft.com/office/powerpoint/2010/main" val="2332174428"/>
+        <p14:creationId xmlns:p14="http://schemas.microsoft.com/office/powerpoint/2010/main" val="1066137268"/>
       </p:ext>
     </p:extLst>
   </p:cSld>
@@ -7372,9 +7852,18 @@
           <a:lstStyle/>
           <a:p>
             <a:r>
+              <a:rPr lang="pt-BR" dirty="0" err="1"/>
+              <a:t>AlexNet</a:t>
+            </a:r>
+            <a:r>
               <a:rPr lang="pt-BR" dirty="0"/>
-              <a:t>Experimentos</a:t>
-            </a:r>
+              <a:t> e </a:t>
+            </a:r>
+            <a:r>
+              <a:rPr lang="pt-BR" dirty="0" err="1"/>
+              <a:t>ResNet</a:t>
+            </a:r>
+            <a:endParaRPr lang="pt-BR" dirty="0"/>
           </a:p>
         </p:txBody>
       </p:sp>
@@ -7509,7 +7998,7 @@
     </p:spTree>
     <p:extLst>
       <p:ext uri="{BB962C8B-B14F-4D97-AF65-F5344CB8AC3E}">
-        <p14:creationId xmlns:p14="http://schemas.microsoft.com/office/powerpoint/2010/main" val="3342025902"/>
+        <p14:creationId xmlns:p14="http://schemas.microsoft.com/office/powerpoint/2010/main" val="2707637187"/>
       </p:ext>
     </p:extLst>
   </p:cSld>
@@ -7588,9 +8077,18 @@
           <a:lstStyle/>
           <a:p>
             <a:r>
+              <a:rPr lang="pt-BR" dirty="0" err="1"/>
+              <a:t>AlexNet</a:t>
+            </a:r>
+            <a:r>
               <a:rPr lang="pt-BR" dirty="0"/>
-              <a:t>Experimentos</a:t>
-            </a:r>
+              <a:t> e </a:t>
+            </a:r>
+            <a:r>
+              <a:rPr lang="pt-BR" dirty="0" err="1"/>
+              <a:t>ResNet</a:t>
+            </a:r>
+            <a:endParaRPr lang="pt-BR" dirty="0"/>
           </a:p>
         </p:txBody>
       </p:sp>
@@ -7700,7 +8198,7 @@
     </p:spTree>
     <p:extLst>
       <p:ext uri="{BB962C8B-B14F-4D97-AF65-F5344CB8AC3E}">
-        <p14:creationId xmlns:p14="http://schemas.microsoft.com/office/powerpoint/2010/main" val="3156822045"/>
+        <p14:creationId xmlns:p14="http://schemas.microsoft.com/office/powerpoint/2010/main" val="2332174428"/>
       </p:ext>
     </p:extLst>
   </p:cSld>
@@ -7755,7 +8253,7 @@
           <a:p>
             <a:r>
               <a:rPr lang="pt-BR" dirty="0"/>
-              <a:t>Resultados</a:t>
+              <a:t>Experimentos</a:t>
             </a:r>
           </a:p>
         </p:txBody>
@@ -7891,7 +8389,7 @@
     </p:spTree>
     <p:extLst>
       <p:ext uri="{BB962C8B-B14F-4D97-AF65-F5344CB8AC3E}">
-        <p14:creationId xmlns:p14="http://schemas.microsoft.com/office/powerpoint/2010/main" val="3193338241"/>
+        <p14:creationId xmlns:p14="http://schemas.microsoft.com/office/powerpoint/2010/main" val="3342025902"/>
       </p:ext>
     </p:extLst>
   </p:cSld>

</xml_diff>